<commit_message>
Complete TODO 3 (BFS)
</commit_message>
<xml_diff>
--- a/drawboard.pptx
+++ b/drawboard.pptx
@@ -6,6 +6,7 @@
   </p:sldMasterIdLst>
   <p:sldIdLst>
     <p:sldId id="256" r:id="rId2"/>
+    <p:sldId id="257" r:id="rId3"/>
   </p:sldIdLst>
   <p:sldSz cx="9144000" cy="5143500" type="screen16x9"/>
   <p:notesSz cx="6858000" cy="9144000"/>
@@ -107,7 +108,7 @@
   <p:extLst>
     <p:ext uri="{EFAFB233-063F-42B5-8137-9DF3F51BA10A}">
       <p15:sldGuideLst xmlns:p15="http://schemas.microsoft.com/office/powerpoint/2012/main">
-        <p15:guide id="1" orient="horz" pos="1620" userDrawn="1">
+        <p15:guide id="1" orient="horz" pos="1801" userDrawn="1">
           <p15:clr>
             <a:srgbClr val="A4A3A4"/>
           </p15:clr>
@@ -3339,6 +3340,2504 @@
 </p:sld>
 </file>
 
+<file path=ppt/slides/slide2.xml><?xml version="1.0" encoding="utf-8"?>
+<p:sld xmlns:a="http://schemas.openxmlformats.org/drawingml/2006/main" xmlns:r="http://schemas.openxmlformats.org/officeDocument/2006/relationships" xmlns:p="http://schemas.openxmlformats.org/presentationml/2006/main">
+  <p:cSld>
+    <p:spTree>
+      <p:nvGrpSpPr>
+        <p:cNvPr id="1" name=""/>
+        <p:cNvGrpSpPr/>
+        <p:nvPr/>
+      </p:nvGrpSpPr>
+      <p:grpSpPr>
+        <a:xfrm>
+          <a:off x="0" y="0"/>
+          <a:ext cx="0" cy="0"/>
+          <a:chOff x="0" y="0"/>
+          <a:chExt cx="0" cy="0"/>
+        </a:xfrm>
+      </p:grpSpPr>
+      <p:grpSp>
+        <p:nvGrpSpPr>
+          <p:cNvPr id="67" name="群組 66"/>
+          <p:cNvGrpSpPr/>
+          <p:nvPr/>
+        </p:nvGrpSpPr>
+        <p:grpSpPr>
+          <a:xfrm>
+            <a:off x="93212" y="201890"/>
+            <a:ext cx="1135468" cy="1172472"/>
+            <a:chOff x="4667693" y="1477926"/>
+            <a:chExt cx="1135468" cy="1172472"/>
+          </a:xfrm>
+        </p:grpSpPr>
+        <p:sp>
+          <p:nvSpPr>
+            <p:cNvPr id="66" name="手繪多邊形 65"/>
+            <p:cNvSpPr/>
+            <p:nvPr/>
+          </p:nvSpPr>
+          <p:spPr>
+            <a:xfrm>
+              <a:off x="4667693" y="1477926"/>
+              <a:ext cx="1135468" cy="1172472"/>
+            </a:xfrm>
+            <a:custGeom>
+              <a:avLst/>
+              <a:gdLst>
+                <a:gd name="connsiteX0" fmla="*/ 536944 w 1135468"/>
+                <a:gd name="connsiteY0" fmla="*/ 0 h 1172472"/>
+                <a:gd name="connsiteX1" fmla="*/ 1073888 w 1135468"/>
+                <a:gd name="connsiteY1" fmla="*/ 536944 h 1172472"/>
+                <a:gd name="connsiteX2" fmla="*/ 1070364 w 1135468"/>
+                <a:gd name="connsiteY2" fmla="*/ 571900 h 1172472"/>
+                <a:gd name="connsiteX3" fmla="*/ 1080220 w 1135468"/>
+                <a:gd name="connsiteY3" fmla="*/ 579142 h 1172472"/>
+                <a:gd name="connsiteX4" fmla="*/ 1106807 w 1135468"/>
+                <a:gd name="connsiteY4" fmla="*/ 610436 h 1172472"/>
+                <a:gd name="connsiteX5" fmla="*/ 1135468 w 1135468"/>
+                <a:gd name="connsiteY5" fmla="*/ 680705 h 1172472"/>
+                <a:gd name="connsiteX6" fmla="*/ 1134470 w 1135468"/>
+                <a:gd name="connsiteY6" fmla="*/ 697970 h 1172472"/>
+                <a:gd name="connsiteX7" fmla="*/ 1134509 w 1135468"/>
+                <a:gd name="connsiteY7" fmla="*/ 712845 h 1172472"/>
+                <a:gd name="connsiteX8" fmla="*/ 1070679 w 1135468"/>
+                <a:gd name="connsiteY8" fmla="*/ 812503 h 1172472"/>
+                <a:gd name="connsiteX9" fmla="*/ 1011838 w 1135468"/>
+                <a:gd name="connsiteY9" fmla="*/ 837385 h 1172472"/>
+                <a:gd name="connsiteX10" fmla="*/ 989389 w 1135468"/>
+                <a:gd name="connsiteY10" fmla="*/ 839261 h 1172472"/>
+                <a:gd name="connsiteX11" fmla="*/ 992213 w 1135468"/>
+                <a:gd name="connsiteY11" fmla="*/ 855121 h 1172472"/>
+                <a:gd name="connsiteX12" fmla="*/ 996261 w 1135468"/>
+                <a:gd name="connsiteY12" fmla="*/ 873069 h 1172472"/>
+                <a:gd name="connsiteX13" fmla="*/ 959554 w 1135468"/>
+                <a:gd name="connsiteY13" fmla="*/ 976047 h 1172472"/>
+                <a:gd name="connsiteX14" fmla="*/ 953572 w 1135468"/>
+                <a:gd name="connsiteY14" fmla="*/ 978783 h 1172472"/>
+                <a:gd name="connsiteX15" fmla="*/ 962413 w 1135468"/>
+                <a:gd name="connsiteY15" fmla="*/ 998416 h 1172472"/>
+                <a:gd name="connsiteX16" fmla="*/ 966989 w 1135468"/>
+                <a:gd name="connsiteY16" fmla="*/ 1018339 h 1172472"/>
+                <a:gd name="connsiteX17" fmla="*/ 971764 w 1135468"/>
+                <a:gd name="connsiteY17" fmla="*/ 1035791 h 1172472"/>
+                <a:gd name="connsiteX18" fmla="*/ 944518 w 1135468"/>
+                <a:gd name="connsiteY18" fmla="*/ 1132301 h 1172472"/>
+                <a:gd name="connsiteX19" fmla="*/ 871624 w 1135468"/>
+                <a:gd name="connsiteY19" fmla="*/ 1136234 h 1172472"/>
+                <a:gd name="connsiteX20" fmla="*/ 849568 w 1135468"/>
+                <a:gd name="connsiteY20" fmla="*/ 1125098 h 1172472"/>
+                <a:gd name="connsiteX21" fmla="*/ 840891 w 1135468"/>
+                <a:gd name="connsiteY21" fmla="*/ 1144666 h 1172472"/>
+                <a:gd name="connsiteX22" fmla="*/ 824334 w 1135468"/>
+                <a:gd name="connsiteY22" fmla="*/ 1161543 h 1172472"/>
+                <a:gd name="connsiteX23" fmla="*/ 724518 w 1135468"/>
+                <a:gd name="connsiteY23" fmla="*/ 1151884 h 1172472"/>
+                <a:gd name="connsiteX24" fmla="*/ 711733 w 1135468"/>
+                <a:gd name="connsiteY24" fmla="*/ 1142391 h 1172472"/>
+                <a:gd name="connsiteX25" fmla="*/ 693010 w 1135468"/>
+                <a:gd name="connsiteY25" fmla="*/ 1129653 h 1172472"/>
+                <a:gd name="connsiteX26" fmla="*/ 660025 w 1135468"/>
+                <a:gd name="connsiteY26" fmla="*/ 1096045 h 1172472"/>
+                <a:gd name="connsiteX27" fmla="*/ 656258 w 1135468"/>
+                <a:gd name="connsiteY27" fmla="*/ 1091118 h 1172472"/>
+                <a:gd name="connsiteX28" fmla="*/ 653422 w 1135468"/>
+                <a:gd name="connsiteY28" fmla="*/ 1094792 h 1172472"/>
+                <a:gd name="connsiteX29" fmla="*/ 635635 w 1135468"/>
+                <a:gd name="connsiteY29" fmla="*/ 1109870 h 1172472"/>
+                <a:gd name="connsiteX30" fmla="*/ 553057 w 1135468"/>
+                <a:gd name="connsiteY30" fmla="*/ 1125430 h 1172472"/>
+                <a:gd name="connsiteX31" fmla="*/ 544306 w 1135468"/>
+                <a:gd name="connsiteY31" fmla="*/ 1121840 h 1172472"/>
+                <a:gd name="connsiteX32" fmla="*/ 533850 w 1135468"/>
+                <a:gd name="connsiteY32" fmla="*/ 1118263 h 1172472"/>
+                <a:gd name="connsiteX33" fmla="*/ 521431 w 1135468"/>
+                <a:gd name="connsiteY33" fmla="*/ 1129539 h 1172472"/>
+                <a:gd name="connsiteX34" fmla="*/ 432519 w 1135468"/>
+                <a:gd name="connsiteY34" fmla="*/ 1135831 h 1172472"/>
+                <a:gd name="connsiteX35" fmla="*/ 422286 w 1135468"/>
+                <a:gd name="connsiteY35" fmla="*/ 1130072 h 1172472"/>
+                <a:gd name="connsiteX36" fmla="*/ 407138 w 1135468"/>
+                <a:gd name="connsiteY36" fmla="*/ 1122564 h 1172472"/>
+                <a:gd name="connsiteX37" fmla="*/ 357103 w 1135468"/>
+                <a:gd name="connsiteY37" fmla="*/ 1069383 h 1172472"/>
+                <a:gd name="connsiteX38" fmla="*/ 337196 w 1135468"/>
+                <a:gd name="connsiteY38" fmla="*/ 1034888 h 1172472"/>
+                <a:gd name="connsiteX39" fmla="*/ 337063 w 1135468"/>
+                <a:gd name="connsiteY39" fmla="*/ 1034524 h 1172472"/>
+                <a:gd name="connsiteX40" fmla="*/ 327941 w 1135468"/>
+                <a:gd name="connsiteY40" fmla="*/ 1031692 h 1172472"/>
+                <a:gd name="connsiteX41" fmla="*/ 0 w 1135468"/>
+                <a:gd name="connsiteY41" fmla="*/ 536944 h 1172472"/>
+                <a:gd name="connsiteX42" fmla="*/ 536944 w 1135468"/>
+                <a:gd name="connsiteY42" fmla="*/ 0 h 1172472"/>
+              </a:gdLst>
+              <a:ahLst/>
+              <a:cxnLst>
+                <a:cxn ang="0">
+                  <a:pos x="connsiteX0" y="connsiteY0"/>
+                </a:cxn>
+                <a:cxn ang="0">
+                  <a:pos x="connsiteX1" y="connsiteY1"/>
+                </a:cxn>
+                <a:cxn ang="0">
+                  <a:pos x="connsiteX2" y="connsiteY2"/>
+                </a:cxn>
+                <a:cxn ang="0">
+                  <a:pos x="connsiteX3" y="connsiteY3"/>
+                </a:cxn>
+                <a:cxn ang="0">
+                  <a:pos x="connsiteX4" y="connsiteY4"/>
+                </a:cxn>
+                <a:cxn ang="0">
+                  <a:pos x="connsiteX5" y="connsiteY5"/>
+                </a:cxn>
+                <a:cxn ang="0">
+                  <a:pos x="connsiteX6" y="connsiteY6"/>
+                </a:cxn>
+                <a:cxn ang="0">
+                  <a:pos x="connsiteX7" y="connsiteY7"/>
+                </a:cxn>
+                <a:cxn ang="0">
+                  <a:pos x="connsiteX8" y="connsiteY8"/>
+                </a:cxn>
+                <a:cxn ang="0">
+                  <a:pos x="connsiteX9" y="connsiteY9"/>
+                </a:cxn>
+                <a:cxn ang="0">
+                  <a:pos x="connsiteX10" y="connsiteY10"/>
+                </a:cxn>
+                <a:cxn ang="0">
+                  <a:pos x="connsiteX11" y="connsiteY11"/>
+                </a:cxn>
+                <a:cxn ang="0">
+                  <a:pos x="connsiteX12" y="connsiteY12"/>
+                </a:cxn>
+                <a:cxn ang="0">
+                  <a:pos x="connsiteX13" y="connsiteY13"/>
+                </a:cxn>
+                <a:cxn ang="0">
+                  <a:pos x="connsiteX14" y="connsiteY14"/>
+                </a:cxn>
+                <a:cxn ang="0">
+                  <a:pos x="connsiteX15" y="connsiteY15"/>
+                </a:cxn>
+                <a:cxn ang="0">
+                  <a:pos x="connsiteX16" y="connsiteY16"/>
+                </a:cxn>
+                <a:cxn ang="0">
+                  <a:pos x="connsiteX17" y="connsiteY17"/>
+                </a:cxn>
+                <a:cxn ang="0">
+                  <a:pos x="connsiteX18" y="connsiteY18"/>
+                </a:cxn>
+                <a:cxn ang="0">
+                  <a:pos x="connsiteX19" y="connsiteY19"/>
+                </a:cxn>
+                <a:cxn ang="0">
+                  <a:pos x="connsiteX20" y="connsiteY20"/>
+                </a:cxn>
+                <a:cxn ang="0">
+                  <a:pos x="connsiteX21" y="connsiteY21"/>
+                </a:cxn>
+                <a:cxn ang="0">
+                  <a:pos x="connsiteX22" y="connsiteY22"/>
+                </a:cxn>
+                <a:cxn ang="0">
+                  <a:pos x="connsiteX23" y="connsiteY23"/>
+                </a:cxn>
+                <a:cxn ang="0">
+                  <a:pos x="connsiteX24" y="connsiteY24"/>
+                </a:cxn>
+                <a:cxn ang="0">
+                  <a:pos x="connsiteX25" y="connsiteY25"/>
+                </a:cxn>
+                <a:cxn ang="0">
+                  <a:pos x="connsiteX26" y="connsiteY26"/>
+                </a:cxn>
+                <a:cxn ang="0">
+                  <a:pos x="connsiteX27" y="connsiteY27"/>
+                </a:cxn>
+                <a:cxn ang="0">
+                  <a:pos x="connsiteX28" y="connsiteY28"/>
+                </a:cxn>
+                <a:cxn ang="0">
+                  <a:pos x="connsiteX29" y="connsiteY29"/>
+                </a:cxn>
+                <a:cxn ang="0">
+                  <a:pos x="connsiteX30" y="connsiteY30"/>
+                </a:cxn>
+                <a:cxn ang="0">
+                  <a:pos x="connsiteX31" y="connsiteY31"/>
+                </a:cxn>
+                <a:cxn ang="0">
+                  <a:pos x="connsiteX32" y="connsiteY32"/>
+                </a:cxn>
+                <a:cxn ang="0">
+                  <a:pos x="connsiteX33" y="connsiteY33"/>
+                </a:cxn>
+                <a:cxn ang="0">
+                  <a:pos x="connsiteX34" y="connsiteY34"/>
+                </a:cxn>
+                <a:cxn ang="0">
+                  <a:pos x="connsiteX35" y="connsiteY35"/>
+                </a:cxn>
+                <a:cxn ang="0">
+                  <a:pos x="connsiteX36" y="connsiteY36"/>
+                </a:cxn>
+                <a:cxn ang="0">
+                  <a:pos x="connsiteX37" y="connsiteY37"/>
+                </a:cxn>
+                <a:cxn ang="0">
+                  <a:pos x="connsiteX38" y="connsiteY38"/>
+                </a:cxn>
+                <a:cxn ang="0">
+                  <a:pos x="connsiteX39" y="connsiteY39"/>
+                </a:cxn>
+                <a:cxn ang="0">
+                  <a:pos x="connsiteX40" y="connsiteY40"/>
+                </a:cxn>
+                <a:cxn ang="0">
+                  <a:pos x="connsiteX41" y="connsiteY41"/>
+                </a:cxn>
+                <a:cxn ang="0">
+                  <a:pos x="connsiteX42" y="connsiteY42"/>
+                </a:cxn>
+              </a:cxnLst>
+              <a:rect l="l" t="t" r="r" b="b"/>
+              <a:pathLst>
+                <a:path w="1135468" h="1172472">
+                  <a:moveTo>
+                    <a:pt x="536944" y="0"/>
+                  </a:moveTo>
+                  <a:cubicBezTo>
+                    <a:pt x="833490" y="0"/>
+                    <a:pt x="1073888" y="240398"/>
+                    <a:pt x="1073888" y="536944"/>
+                  </a:cubicBezTo>
+                  <a:lnTo>
+                    <a:pt x="1070364" y="571900"/>
+                  </a:lnTo>
+                  <a:lnTo>
+                    <a:pt x="1080220" y="579142"/>
+                  </a:lnTo>
+                  <a:cubicBezTo>
+                    <a:pt x="1089583" y="587947"/>
+                    <a:pt x="1098633" y="598477"/>
+                    <a:pt x="1106807" y="610436"/>
+                  </a:cubicBezTo>
+                  <a:cubicBezTo>
+                    <a:pt x="1123155" y="634354"/>
+                    <a:pt x="1132912" y="659456"/>
+                    <a:pt x="1135468" y="680705"/>
+                  </a:cubicBezTo>
+                  <a:lnTo>
+                    <a:pt x="1134470" y="697970"/>
+                  </a:lnTo>
+                  <a:lnTo>
+                    <a:pt x="1134509" y="712845"/>
+                  </a:lnTo>
+                  <a:cubicBezTo>
+                    <a:pt x="1130767" y="749207"/>
+                    <a:pt x="1108116" y="786915"/>
+                    <a:pt x="1070679" y="812503"/>
+                  </a:cubicBezTo>
+                  <a:cubicBezTo>
+                    <a:pt x="1051961" y="825298"/>
+                    <a:pt x="1031763" y="833548"/>
+                    <a:pt x="1011838" y="837385"/>
+                  </a:cubicBezTo>
+                  <a:lnTo>
+                    <a:pt x="989389" y="839261"/>
+                  </a:lnTo>
+                  <a:lnTo>
+                    <a:pt x="992213" y="855121"/>
+                  </a:lnTo>
+                  <a:lnTo>
+                    <a:pt x="996261" y="873069"/>
+                  </a:lnTo>
+                  <a:cubicBezTo>
+                    <a:pt x="1002334" y="915910"/>
+                    <a:pt x="989938" y="955279"/>
+                    <a:pt x="959554" y="976047"/>
+                  </a:cubicBezTo>
+                  <a:lnTo>
+                    <a:pt x="953572" y="978783"/>
+                  </a:lnTo>
+                  <a:lnTo>
+                    <a:pt x="962413" y="998416"/>
+                  </a:lnTo>
+                  <a:lnTo>
+                    <a:pt x="966989" y="1018339"/>
+                  </a:lnTo>
+                  <a:lnTo>
+                    <a:pt x="971764" y="1035791"/>
+                  </a:lnTo>
+                  <a:cubicBezTo>
+                    <a:pt x="979887" y="1077231"/>
+                    <a:pt x="970964" y="1114225"/>
+                    <a:pt x="944518" y="1132301"/>
+                  </a:cubicBezTo>
+                  <a:cubicBezTo>
+                    <a:pt x="924684" y="1145859"/>
+                    <a:pt x="898514" y="1146368"/>
+                    <a:pt x="871624" y="1136234"/>
+                  </a:cubicBezTo>
+                  <a:lnTo>
+                    <a:pt x="849568" y="1125098"/>
+                  </a:lnTo>
+                  <a:lnTo>
+                    <a:pt x="840891" y="1144666"/>
+                  </a:lnTo>
+                  <a:cubicBezTo>
+                    <a:pt x="836462" y="1151324"/>
+                    <a:pt x="830945" y="1157025"/>
+                    <a:pt x="824334" y="1161543"/>
+                  </a:cubicBezTo>
+                  <a:cubicBezTo>
+                    <a:pt x="797888" y="1179620"/>
+                    <a:pt x="760179" y="1174501"/>
+                    <a:pt x="724518" y="1151884"/>
+                  </a:cubicBezTo>
+                  <a:lnTo>
+                    <a:pt x="711733" y="1142391"/>
+                  </a:lnTo>
+                  <a:lnTo>
+                    <a:pt x="693010" y="1129653"/>
+                  </a:lnTo>
+                  <a:cubicBezTo>
+                    <a:pt x="682682" y="1120728"/>
+                    <a:pt x="671483" y="1109349"/>
+                    <a:pt x="660025" y="1096045"/>
+                  </a:cubicBezTo>
+                  <a:lnTo>
+                    <a:pt x="656258" y="1091118"/>
+                  </a:lnTo>
+                  <a:lnTo>
+                    <a:pt x="653422" y="1094792"/>
+                  </a:lnTo>
+                  <a:cubicBezTo>
+                    <a:pt x="648189" y="1100274"/>
+                    <a:pt x="642247" y="1105351"/>
+                    <a:pt x="635635" y="1109870"/>
+                  </a:cubicBezTo>
+                  <a:cubicBezTo>
+                    <a:pt x="609189" y="1127947"/>
+                    <a:pt x="578317" y="1132830"/>
+                    <a:pt x="553057" y="1125430"/>
+                  </a:cubicBezTo>
+                  <a:lnTo>
+                    <a:pt x="544306" y="1121840"/>
+                  </a:lnTo>
+                  <a:lnTo>
+                    <a:pt x="533850" y="1118263"/>
+                  </a:lnTo>
+                  <a:lnTo>
+                    <a:pt x="521431" y="1129539"/>
+                  </a:lnTo>
+                  <a:cubicBezTo>
+                    <a:pt x="494985" y="1147615"/>
+                    <a:pt x="461601" y="1148823"/>
+                    <a:pt x="432519" y="1135831"/>
+                  </a:cubicBezTo>
+                  <a:lnTo>
+                    <a:pt x="422286" y="1130072"/>
+                  </a:lnTo>
+                  <a:lnTo>
+                    <a:pt x="407138" y="1122564"/>
+                  </a:lnTo>
+                  <a:cubicBezTo>
+                    <a:pt x="390957" y="1111261"/>
+                    <a:pt x="373001" y="1092640"/>
+                    <a:pt x="357103" y="1069383"/>
+                  </a:cubicBezTo>
+                  <a:cubicBezTo>
+                    <a:pt x="349154" y="1057753"/>
+                    <a:pt x="342473" y="1046066"/>
+                    <a:pt x="337196" y="1034888"/>
+                  </a:cubicBezTo>
+                  <a:lnTo>
+                    <a:pt x="337063" y="1034524"/>
+                  </a:lnTo>
+                  <a:lnTo>
+                    <a:pt x="327941" y="1031692"/>
+                  </a:lnTo>
+                  <a:cubicBezTo>
+                    <a:pt x="135224" y="950180"/>
+                    <a:pt x="0" y="759354"/>
+                    <a:pt x="0" y="536944"/>
+                  </a:cubicBezTo>
+                  <a:cubicBezTo>
+                    <a:pt x="0" y="240398"/>
+                    <a:pt x="240398" y="0"/>
+                    <a:pt x="536944" y="0"/>
+                  </a:cubicBezTo>
+                  <a:close/>
+                </a:path>
+              </a:pathLst>
+            </a:custGeom>
+            <a:gradFill flip="none" rotWithShape="1">
+              <a:gsLst>
+                <a:gs pos="40377">
+                  <a:srgbClr val="6BAC63"/>
+                </a:gs>
+                <a:gs pos="23850">
+                  <a:srgbClr val="76BE6D"/>
+                </a:gs>
+                <a:gs pos="0">
+                  <a:srgbClr val="84C873"/>
+                </a:gs>
+                <a:gs pos="65000">
+                  <a:srgbClr val="4C7940"/>
+                </a:gs>
+                <a:gs pos="53000">
+                  <a:srgbClr val="578C50"/>
+                </a:gs>
+                <a:gs pos="100000">
+                  <a:schemeClr val="accent6">
+                    <a:lumMod val="50000"/>
+                  </a:schemeClr>
+                </a:gs>
+              </a:gsLst>
+              <a:lin ang="2400000" scaled="0"/>
+              <a:tileRect/>
+            </a:gradFill>
+            <a:ln>
+              <a:solidFill>
+                <a:srgbClr val="3C6238"/>
+              </a:solidFill>
+            </a:ln>
+          </p:spPr>
+          <p:style>
+            <a:lnRef idx="2">
+              <a:schemeClr val="accent1">
+                <a:shade val="50000"/>
+              </a:schemeClr>
+            </a:lnRef>
+            <a:fillRef idx="1">
+              <a:schemeClr val="accent1"/>
+            </a:fillRef>
+            <a:effectRef idx="0">
+              <a:schemeClr val="accent1"/>
+            </a:effectRef>
+            <a:fontRef idx="minor">
+              <a:schemeClr val="lt1"/>
+            </a:fontRef>
+          </p:style>
+          <p:txBody>
+            <a:bodyPr rtlCol="0" anchor="ctr"/>
+            <a:lstStyle/>
+            <a:p>
+              <a:pPr algn="ctr"/>
+              <a:endParaRPr lang="zh-TW" altLang="en-US"/>
+            </a:p>
+          </p:txBody>
+        </p:sp>
+        <p:sp>
+          <p:nvSpPr>
+            <p:cNvPr id="28" name="橢圓 27"/>
+            <p:cNvSpPr/>
+            <p:nvPr/>
+          </p:nvSpPr>
+          <p:spPr>
+            <a:xfrm>
+              <a:off x="4900458" y="1616709"/>
+              <a:ext cx="232764" cy="232764"/>
+            </a:xfrm>
+            <a:prstGeom prst="ellipse">
+              <a:avLst/>
+            </a:prstGeom>
+            <a:gradFill flip="none" rotWithShape="1">
+              <a:gsLst>
+                <a:gs pos="26000">
+                  <a:schemeClr val="bg1"/>
+                </a:gs>
+                <a:gs pos="79000">
+                  <a:srgbClr val="6FB367"/>
+                </a:gs>
+              </a:gsLst>
+              <a:path path="circle">
+                <a:fillToRect l="50000" t="50000" r="50000" b="50000"/>
+              </a:path>
+              <a:tileRect/>
+            </a:gradFill>
+            <a:ln>
+              <a:noFill/>
+            </a:ln>
+          </p:spPr>
+          <p:style>
+            <a:lnRef idx="2">
+              <a:schemeClr val="accent1">
+                <a:shade val="50000"/>
+              </a:schemeClr>
+            </a:lnRef>
+            <a:fillRef idx="1">
+              <a:schemeClr val="accent1"/>
+            </a:fillRef>
+            <a:effectRef idx="0">
+              <a:schemeClr val="accent1"/>
+            </a:effectRef>
+            <a:fontRef idx="minor">
+              <a:schemeClr val="lt1"/>
+            </a:fontRef>
+          </p:style>
+          <p:txBody>
+            <a:bodyPr rtlCol="0" anchor="ctr"/>
+            <a:lstStyle/>
+            <a:p>
+              <a:pPr algn="ctr"/>
+              <a:endParaRPr lang="zh-TW" altLang="en-US"/>
+            </a:p>
+          </p:txBody>
+        </p:sp>
+      </p:grpSp>
+      <p:grpSp>
+        <p:nvGrpSpPr>
+          <p:cNvPr id="112" name="群組 111"/>
+          <p:cNvGrpSpPr/>
+          <p:nvPr/>
+        </p:nvGrpSpPr>
+        <p:grpSpPr>
+          <a:xfrm>
+            <a:off x="2307423" y="429008"/>
+            <a:ext cx="1251256" cy="861080"/>
+            <a:chOff x="2821773" y="1562490"/>
+            <a:chExt cx="1251256" cy="861080"/>
+          </a:xfrm>
+        </p:grpSpPr>
+        <p:grpSp>
+          <p:nvGrpSpPr>
+            <p:cNvPr id="111" name="群組 110"/>
+            <p:cNvGrpSpPr/>
+            <p:nvPr/>
+          </p:nvGrpSpPr>
+          <p:grpSpPr>
+            <a:xfrm>
+              <a:off x="2821773" y="1562490"/>
+              <a:ext cx="850605" cy="861080"/>
+              <a:chOff x="2821773" y="1562490"/>
+              <a:chExt cx="850605" cy="861080"/>
+            </a:xfrm>
+          </p:grpSpPr>
+          <p:grpSp>
+            <p:nvGrpSpPr>
+              <p:cNvPr id="75" name="群組 74"/>
+              <p:cNvGrpSpPr/>
+              <p:nvPr/>
+            </p:nvGrpSpPr>
+            <p:grpSpPr>
+              <a:xfrm>
+                <a:off x="2821773" y="1562490"/>
+                <a:ext cx="850604" cy="276447"/>
+                <a:chOff x="2823332" y="1382033"/>
+                <a:chExt cx="850604" cy="276447"/>
+              </a:xfrm>
+            </p:grpSpPr>
+            <p:sp>
+              <p:nvSpPr>
+                <p:cNvPr id="68" name="剪去同側角落矩形 67"/>
+                <p:cNvSpPr/>
+                <p:nvPr/>
+              </p:nvSpPr>
+              <p:spPr>
+                <a:xfrm>
+                  <a:off x="2823332" y="1382033"/>
+                  <a:ext cx="850604" cy="276447"/>
+                </a:xfrm>
+                <a:prstGeom prst="snip2SameRect">
+                  <a:avLst/>
+                </a:prstGeom>
+                <a:solidFill>
+                  <a:schemeClr val="tx1">
+                    <a:lumMod val="75000"/>
+                    <a:lumOff val="25000"/>
+                  </a:schemeClr>
+                </a:solidFill>
+                <a:ln>
+                  <a:solidFill>
+                    <a:schemeClr val="bg2">
+                      <a:lumMod val="25000"/>
+                    </a:schemeClr>
+                  </a:solidFill>
+                </a:ln>
+              </p:spPr>
+              <p:style>
+                <a:lnRef idx="2">
+                  <a:schemeClr val="accent1">
+                    <a:shade val="50000"/>
+                  </a:schemeClr>
+                </a:lnRef>
+                <a:fillRef idx="1">
+                  <a:schemeClr val="accent1"/>
+                </a:fillRef>
+                <a:effectRef idx="0">
+                  <a:schemeClr val="accent1"/>
+                </a:effectRef>
+                <a:fontRef idx="minor">
+                  <a:schemeClr val="lt1"/>
+                </a:fontRef>
+              </p:style>
+              <p:txBody>
+                <a:bodyPr rtlCol="0" anchor="ctr"/>
+                <a:lstStyle/>
+                <a:p>
+                  <a:pPr algn="ctr"/>
+                  <a:endParaRPr lang="zh-TW" altLang="en-US"/>
+                </a:p>
+              </p:txBody>
+            </p:sp>
+            <p:sp>
+              <p:nvSpPr>
+                <p:cNvPr id="69" name="矩形 68"/>
+                <p:cNvSpPr/>
+                <p:nvPr/>
+              </p:nvSpPr>
+              <p:spPr>
+                <a:xfrm>
+                  <a:off x="2897483" y="1382033"/>
+                  <a:ext cx="78581" cy="119062"/>
+                </a:xfrm>
+                <a:prstGeom prst="rect">
+                  <a:avLst/>
+                </a:prstGeom>
+                <a:solidFill>
+                  <a:schemeClr val="tx1">
+                    <a:lumMod val="85000"/>
+                    <a:lumOff val="15000"/>
+                  </a:schemeClr>
+                </a:solidFill>
+                <a:ln>
+                  <a:noFill/>
+                </a:ln>
+              </p:spPr>
+              <p:style>
+                <a:lnRef idx="2">
+                  <a:schemeClr val="accent1">
+                    <a:shade val="50000"/>
+                  </a:schemeClr>
+                </a:lnRef>
+                <a:fillRef idx="1">
+                  <a:schemeClr val="accent1"/>
+                </a:fillRef>
+                <a:effectRef idx="0">
+                  <a:schemeClr val="accent1"/>
+                </a:effectRef>
+                <a:fontRef idx="minor">
+                  <a:schemeClr val="lt1"/>
+                </a:fontRef>
+              </p:style>
+              <p:txBody>
+                <a:bodyPr rtlCol="0" anchor="ctr"/>
+                <a:lstStyle/>
+                <a:p>
+                  <a:pPr algn="ctr"/>
+                  <a:endParaRPr lang="zh-TW" altLang="en-US"/>
+                </a:p>
+              </p:txBody>
+            </p:sp>
+            <p:sp>
+              <p:nvSpPr>
+                <p:cNvPr id="70" name="矩形 69"/>
+                <p:cNvSpPr/>
+                <p:nvPr/>
+              </p:nvSpPr>
+              <p:spPr>
+                <a:xfrm>
+                  <a:off x="3053413" y="1382033"/>
+                  <a:ext cx="78581" cy="119062"/>
+                </a:xfrm>
+                <a:prstGeom prst="rect">
+                  <a:avLst/>
+                </a:prstGeom>
+                <a:solidFill>
+                  <a:schemeClr val="tx1">
+                    <a:lumMod val="85000"/>
+                    <a:lumOff val="15000"/>
+                  </a:schemeClr>
+                </a:solidFill>
+                <a:ln>
+                  <a:noFill/>
+                </a:ln>
+              </p:spPr>
+              <p:style>
+                <a:lnRef idx="2">
+                  <a:schemeClr val="accent1">
+                    <a:shade val="50000"/>
+                  </a:schemeClr>
+                </a:lnRef>
+                <a:fillRef idx="1">
+                  <a:schemeClr val="accent1"/>
+                </a:fillRef>
+                <a:effectRef idx="0">
+                  <a:schemeClr val="accent1"/>
+                </a:effectRef>
+                <a:fontRef idx="minor">
+                  <a:schemeClr val="lt1"/>
+                </a:fontRef>
+              </p:style>
+              <p:txBody>
+                <a:bodyPr rtlCol="0" anchor="ctr"/>
+                <a:lstStyle/>
+                <a:p>
+                  <a:pPr algn="ctr"/>
+                  <a:endParaRPr lang="zh-TW" altLang="en-US"/>
+                </a:p>
+              </p:txBody>
+            </p:sp>
+            <p:sp>
+              <p:nvSpPr>
+                <p:cNvPr id="71" name="矩形 70"/>
+                <p:cNvSpPr/>
+                <p:nvPr/>
+              </p:nvSpPr>
+              <p:spPr>
+                <a:xfrm>
+                  <a:off x="3521204" y="1382033"/>
+                  <a:ext cx="78581" cy="119062"/>
+                </a:xfrm>
+                <a:prstGeom prst="rect">
+                  <a:avLst/>
+                </a:prstGeom>
+                <a:solidFill>
+                  <a:schemeClr val="tx1">
+                    <a:lumMod val="85000"/>
+                    <a:lumOff val="15000"/>
+                  </a:schemeClr>
+                </a:solidFill>
+                <a:ln>
+                  <a:noFill/>
+                </a:ln>
+              </p:spPr>
+              <p:style>
+                <a:lnRef idx="2">
+                  <a:schemeClr val="accent1">
+                    <a:shade val="50000"/>
+                  </a:schemeClr>
+                </a:lnRef>
+                <a:fillRef idx="1">
+                  <a:schemeClr val="accent1"/>
+                </a:fillRef>
+                <a:effectRef idx="0">
+                  <a:schemeClr val="accent1"/>
+                </a:effectRef>
+                <a:fontRef idx="minor">
+                  <a:schemeClr val="lt1"/>
+                </a:fontRef>
+              </p:style>
+              <p:txBody>
+                <a:bodyPr rtlCol="0" anchor="ctr"/>
+                <a:lstStyle/>
+                <a:p>
+                  <a:pPr algn="ctr"/>
+                  <a:endParaRPr lang="zh-TW" altLang="en-US"/>
+                </a:p>
+              </p:txBody>
+            </p:sp>
+            <p:sp>
+              <p:nvSpPr>
+                <p:cNvPr id="72" name="矩形 71"/>
+                <p:cNvSpPr/>
+                <p:nvPr/>
+              </p:nvSpPr>
+              <p:spPr>
+                <a:xfrm>
+                  <a:off x="3209343" y="1382033"/>
+                  <a:ext cx="78581" cy="119062"/>
+                </a:xfrm>
+                <a:prstGeom prst="rect">
+                  <a:avLst/>
+                </a:prstGeom>
+                <a:solidFill>
+                  <a:schemeClr val="tx1">
+                    <a:lumMod val="85000"/>
+                    <a:lumOff val="15000"/>
+                  </a:schemeClr>
+                </a:solidFill>
+                <a:ln>
+                  <a:noFill/>
+                </a:ln>
+              </p:spPr>
+              <p:style>
+                <a:lnRef idx="2">
+                  <a:schemeClr val="accent1">
+                    <a:shade val="50000"/>
+                  </a:schemeClr>
+                </a:lnRef>
+                <a:fillRef idx="1">
+                  <a:schemeClr val="accent1"/>
+                </a:fillRef>
+                <a:effectRef idx="0">
+                  <a:schemeClr val="accent1"/>
+                </a:effectRef>
+                <a:fontRef idx="minor">
+                  <a:schemeClr val="lt1"/>
+                </a:fontRef>
+              </p:style>
+              <p:txBody>
+                <a:bodyPr rtlCol="0" anchor="ctr"/>
+                <a:lstStyle/>
+                <a:p>
+                  <a:pPr algn="ctr"/>
+                  <a:endParaRPr lang="zh-TW" altLang="en-US"/>
+                </a:p>
+              </p:txBody>
+            </p:sp>
+            <p:sp>
+              <p:nvSpPr>
+                <p:cNvPr id="73" name="矩形 72"/>
+                <p:cNvSpPr/>
+                <p:nvPr/>
+              </p:nvSpPr>
+              <p:spPr>
+                <a:xfrm>
+                  <a:off x="3365273" y="1382033"/>
+                  <a:ext cx="78581" cy="119062"/>
+                </a:xfrm>
+                <a:prstGeom prst="rect">
+                  <a:avLst/>
+                </a:prstGeom>
+                <a:solidFill>
+                  <a:schemeClr val="tx1">
+                    <a:lumMod val="85000"/>
+                    <a:lumOff val="15000"/>
+                  </a:schemeClr>
+                </a:solidFill>
+                <a:ln>
+                  <a:noFill/>
+                </a:ln>
+              </p:spPr>
+              <p:style>
+                <a:lnRef idx="2">
+                  <a:schemeClr val="accent1">
+                    <a:shade val="50000"/>
+                  </a:schemeClr>
+                </a:lnRef>
+                <a:fillRef idx="1">
+                  <a:schemeClr val="accent1"/>
+                </a:fillRef>
+                <a:effectRef idx="0">
+                  <a:schemeClr val="accent1"/>
+                </a:effectRef>
+                <a:fontRef idx="minor">
+                  <a:schemeClr val="lt1"/>
+                </a:fontRef>
+              </p:style>
+              <p:txBody>
+                <a:bodyPr rtlCol="0" anchor="ctr"/>
+                <a:lstStyle/>
+                <a:p>
+                  <a:pPr algn="ctr"/>
+                  <a:endParaRPr lang="zh-TW" altLang="en-US"/>
+                </a:p>
+              </p:txBody>
+            </p:sp>
+          </p:grpSp>
+          <p:grpSp>
+            <p:nvGrpSpPr>
+              <p:cNvPr id="76" name="群組 75"/>
+              <p:cNvGrpSpPr/>
+              <p:nvPr/>
+            </p:nvGrpSpPr>
+            <p:grpSpPr>
+              <a:xfrm flipV="1">
+                <a:off x="2821774" y="2147123"/>
+                <a:ext cx="850604" cy="276447"/>
+                <a:chOff x="2823332" y="1382033"/>
+                <a:chExt cx="850604" cy="276447"/>
+              </a:xfrm>
+            </p:grpSpPr>
+            <p:sp>
+              <p:nvSpPr>
+                <p:cNvPr id="77" name="剪去同側角落矩形 76"/>
+                <p:cNvSpPr/>
+                <p:nvPr/>
+              </p:nvSpPr>
+              <p:spPr>
+                <a:xfrm>
+                  <a:off x="2823332" y="1382033"/>
+                  <a:ext cx="850604" cy="276447"/>
+                </a:xfrm>
+                <a:prstGeom prst="snip2SameRect">
+                  <a:avLst/>
+                </a:prstGeom>
+                <a:solidFill>
+                  <a:schemeClr val="tx1">
+                    <a:lumMod val="75000"/>
+                    <a:lumOff val="25000"/>
+                  </a:schemeClr>
+                </a:solidFill>
+                <a:ln>
+                  <a:solidFill>
+                    <a:schemeClr val="bg2">
+                      <a:lumMod val="25000"/>
+                    </a:schemeClr>
+                  </a:solidFill>
+                </a:ln>
+              </p:spPr>
+              <p:style>
+                <a:lnRef idx="2">
+                  <a:schemeClr val="accent1">
+                    <a:shade val="50000"/>
+                  </a:schemeClr>
+                </a:lnRef>
+                <a:fillRef idx="1">
+                  <a:schemeClr val="accent1"/>
+                </a:fillRef>
+                <a:effectRef idx="0">
+                  <a:schemeClr val="accent1"/>
+                </a:effectRef>
+                <a:fontRef idx="minor">
+                  <a:schemeClr val="lt1"/>
+                </a:fontRef>
+              </p:style>
+              <p:txBody>
+                <a:bodyPr rtlCol="0" anchor="ctr"/>
+                <a:lstStyle/>
+                <a:p>
+                  <a:pPr algn="ctr"/>
+                  <a:endParaRPr lang="zh-TW" altLang="en-US"/>
+                </a:p>
+              </p:txBody>
+            </p:sp>
+            <p:sp>
+              <p:nvSpPr>
+                <p:cNvPr id="78" name="矩形 77"/>
+                <p:cNvSpPr/>
+                <p:nvPr/>
+              </p:nvSpPr>
+              <p:spPr>
+                <a:xfrm>
+                  <a:off x="2897483" y="1382033"/>
+                  <a:ext cx="78581" cy="119062"/>
+                </a:xfrm>
+                <a:prstGeom prst="rect">
+                  <a:avLst/>
+                </a:prstGeom>
+                <a:solidFill>
+                  <a:schemeClr val="tx1">
+                    <a:lumMod val="85000"/>
+                    <a:lumOff val="15000"/>
+                  </a:schemeClr>
+                </a:solidFill>
+                <a:ln>
+                  <a:noFill/>
+                </a:ln>
+              </p:spPr>
+              <p:style>
+                <a:lnRef idx="2">
+                  <a:schemeClr val="accent1">
+                    <a:shade val="50000"/>
+                  </a:schemeClr>
+                </a:lnRef>
+                <a:fillRef idx="1">
+                  <a:schemeClr val="accent1"/>
+                </a:fillRef>
+                <a:effectRef idx="0">
+                  <a:schemeClr val="accent1"/>
+                </a:effectRef>
+                <a:fontRef idx="minor">
+                  <a:schemeClr val="lt1"/>
+                </a:fontRef>
+              </p:style>
+              <p:txBody>
+                <a:bodyPr rtlCol="0" anchor="ctr"/>
+                <a:lstStyle/>
+                <a:p>
+                  <a:pPr algn="ctr"/>
+                  <a:endParaRPr lang="zh-TW" altLang="en-US"/>
+                </a:p>
+              </p:txBody>
+            </p:sp>
+            <p:sp>
+              <p:nvSpPr>
+                <p:cNvPr id="79" name="矩形 78"/>
+                <p:cNvSpPr/>
+                <p:nvPr/>
+              </p:nvSpPr>
+              <p:spPr>
+                <a:xfrm>
+                  <a:off x="3053413" y="1382033"/>
+                  <a:ext cx="78581" cy="119062"/>
+                </a:xfrm>
+                <a:prstGeom prst="rect">
+                  <a:avLst/>
+                </a:prstGeom>
+                <a:solidFill>
+                  <a:schemeClr val="tx1">
+                    <a:lumMod val="85000"/>
+                    <a:lumOff val="15000"/>
+                  </a:schemeClr>
+                </a:solidFill>
+                <a:ln>
+                  <a:noFill/>
+                </a:ln>
+              </p:spPr>
+              <p:style>
+                <a:lnRef idx="2">
+                  <a:schemeClr val="accent1">
+                    <a:shade val="50000"/>
+                  </a:schemeClr>
+                </a:lnRef>
+                <a:fillRef idx="1">
+                  <a:schemeClr val="accent1"/>
+                </a:fillRef>
+                <a:effectRef idx="0">
+                  <a:schemeClr val="accent1"/>
+                </a:effectRef>
+                <a:fontRef idx="minor">
+                  <a:schemeClr val="lt1"/>
+                </a:fontRef>
+              </p:style>
+              <p:txBody>
+                <a:bodyPr rtlCol="0" anchor="ctr"/>
+                <a:lstStyle/>
+                <a:p>
+                  <a:pPr algn="ctr"/>
+                  <a:endParaRPr lang="zh-TW" altLang="en-US"/>
+                </a:p>
+              </p:txBody>
+            </p:sp>
+            <p:sp>
+              <p:nvSpPr>
+                <p:cNvPr id="80" name="矩形 79"/>
+                <p:cNvSpPr/>
+                <p:nvPr/>
+              </p:nvSpPr>
+              <p:spPr>
+                <a:xfrm>
+                  <a:off x="3521204" y="1382033"/>
+                  <a:ext cx="78581" cy="119062"/>
+                </a:xfrm>
+                <a:prstGeom prst="rect">
+                  <a:avLst/>
+                </a:prstGeom>
+                <a:solidFill>
+                  <a:schemeClr val="tx1">
+                    <a:lumMod val="85000"/>
+                    <a:lumOff val="15000"/>
+                  </a:schemeClr>
+                </a:solidFill>
+                <a:ln>
+                  <a:noFill/>
+                </a:ln>
+              </p:spPr>
+              <p:style>
+                <a:lnRef idx="2">
+                  <a:schemeClr val="accent1">
+                    <a:shade val="50000"/>
+                  </a:schemeClr>
+                </a:lnRef>
+                <a:fillRef idx="1">
+                  <a:schemeClr val="accent1"/>
+                </a:fillRef>
+                <a:effectRef idx="0">
+                  <a:schemeClr val="accent1"/>
+                </a:effectRef>
+                <a:fontRef idx="minor">
+                  <a:schemeClr val="lt1"/>
+                </a:fontRef>
+              </p:style>
+              <p:txBody>
+                <a:bodyPr rtlCol="0" anchor="ctr"/>
+                <a:lstStyle/>
+                <a:p>
+                  <a:pPr algn="ctr"/>
+                  <a:endParaRPr lang="zh-TW" altLang="en-US"/>
+                </a:p>
+              </p:txBody>
+            </p:sp>
+            <p:sp>
+              <p:nvSpPr>
+                <p:cNvPr id="81" name="矩形 80"/>
+                <p:cNvSpPr/>
+                <p:nvPr/>
+              </p:nvSpPr>
+              <p:spPr>
+                <a:xfrm>
+                  <a:off x="3209343" y="1382033"/>
+                  <a:ext cx="78581" cy="119062"/>
+                </a:xfrm>
+                <a:prstGeom prst="rect">
+                  <a:avLst/>
+                </a:prstGeom>
+                <a:solidFill>
+                  <a:schemeClr val="tx1">
+                    <a:lumMod val="85000"/>
+                    <a:lumOff val="15000"/>
+                  </a:schemeClr>
+                </a:solidFill>
+                <a:ln>
+                  <a:noFill/>
+                </a:ln>
+              </p:spPr>
+              <p:style>
+                <a:lnRef idx="2">
+                  <a:schemeClr val="accent1">
+                    <a:shade val="50000"/>
+                  </a:schemeClr>
+                </a:lnRef>
+                <a:fillRef idx="1">
+                  <a:schemeClr val="accent1"/>
+                </a:fillRef>
+                <a:effectRef idx="0">
+                  <a:schemeClr val="accent1"/>
+                </a:effectRef>
+                <a:fontRef idx="minor">
+                  <a:schemeClr val="lt1"/>
+                </a:fontRef>
+              </p:style>
+              <p:txBody>
+                <a:bodyPr rtlCol="0" anchor="ctr"/>
+                <a:lstStyle/>
+                <a:p>
+                  <a:pPr algn="ctr"/>
+                  <a:endParaRPr lang="zh-TW" altLang="en-US"/>
+                </a:p>
+              </p:txBody>
+            </p:sp>
+            <p:sp>
+              <p:nvSpPr>
+                <p:cNvPr id="82" name="矩形 81"/>
+                <p:cNvSpPr/>
+                <p:nvPr/>
+              </p:nvSpPr>
+              <p:spPr>
+                <a:xfrm>
+                  <a:off x="3365273" y="1382033"/>
+                  <a:ext cx="78581" cy="119062"/>
+                </a:xfrm>
+                <a:prstGeom prst="rect">
+                  <a:avLst/>
+                </a:prstGeom>
+                <a:solidFill>
+                  <a:schemeClr val="tx1">
+                    <a:lumMod val="85000"/>
+                    <a:lumOff val="15000"/>
+                  </a:schemeClr>
+                </a:solidFill>
+                <a:ln>
+                  <a:noFill/>
+                </a:ln>
+              </p:spPr>
+              <p:style>
+                <a:lnRef idx="2">
+                  <a:schemeClr val="accent1">
+                    <a:shade val="50000"/>
+                  </a:schemeClr>
+                </a:lnRef>
+                <a:fillRef idx="1">
+                  <a:schemeClr val="accent1"/>
+                </a:fillRef>
+                <a:effectRef idx="0">
+                  <a:schemeClr val="accent1"/>
+                </a:effectRef>
+                <a:fontRef idx="minor">
+                  <a:schemeClr val="lt1"/>
+                </a:fontRef>
+              </p:style>
+              <p:txBody>
+                <a:bodyPr rtlCol="0" anchor="ctr"/>
+                <a:lstStyle/>
+                <a:p>
+                  <a:pPr algn="ctr"/>
+                  <a:endParaRPr lang="zh-TW" altLang="en-US"/>
+                </a:p>
+              </p:txBody>
+            </p:sp>
+          </p:grpSp>
+        </p:grpSp>
+        <p:grpSp>
+          <p:nvGrpSpPr>
+            <p:cNvPr id="110" name="群組 109"/>
+            <p:cNvGrpSpPr/>
+            <p:nvPr/>
+          </p:nvGrpSpPr>
+          <p:grpSpPr>
+            <a:xfrm>
+              <a:off x="2913872" y="1599302"/>
+              <a:ext cx="1159157" cy="787457"/>
+              <a:chOff x="2894091" y="1570986"/>
+              <a:chExt cx="1159156" cy="787457"/>
+            </a:xfrm>
+          </p:grpSpPr>
+          <p:grpSp>
+            <p:nvGrpSpPr>
+              <p:cNvPr id="109" name="群組 108"/>
+              <p:cNvGrpSpPr/>
+              <p:nvPr/>
+            </p:nvGrpSpPr>
+            <p:grpSpPr>
+              <a:xfrm>
+                <a:off x="2894091" y="1681344"/>
+                <a:ext cx="813098" cy="566739"/>
+                <a:chOff x="2894091" y="1658479"/>
+                <a:chExt cx="813098" cy="566739"/>
+              </a:xfrm>
+            </p:grpSpPr>
+            <p:sp>
+              <p:nvSpPr>
+                <p:cNvPr id="107" name="手繪多邊形 106"/>
+                <p:cNvSpPr/>
+                <p:nvPr/>
+              </p:nvSpPr>
+              <p:spPr>
+                <a:xfrm rot="5400000" flipH="1">
+                  <a:off x="3017270" y="1535300"/>
+                  <a:ext cx="566739" cy="813098"/>
+                </a:xfrm>
+                <a:custGeom>
+                  <a:avLst/>
+                  <a:gdLst>
+                    <a:gd name="connsiteX0" fmla="*/ 566739 w 566739"/>
+                    <a:gd name="connsiteY0" fmla="*/ 813098 h 813098"/>
+                    <a:gd name="connsiteX1" fmla="*/ 566739 w 566739"/>
+                    <a:gd name="connsiteY1" fmla="*/ 196986 h 813098"/>
+                    <a:gd name="connsiteX2" fmla="*/ 472281 w 566739"/>
+                    <a:gd name="connsiteY2" fmla="*/ 102528 h 813098"/>
+                    <a:gd name="connsiteX3" fmla="*/ 366129 w 566739"/>
+                    <a:gd name="connsiteY3" fmla="*/ 102528 h 813098"/>
+                    <a:gd name="connsiteX4" fmla="*/ 366129 w 566739"/>
+                    <a:gd name="connsiteY4" fmla="*/ 25594 h 813098"/>
+                    <a:gd name="connsiteX5" fmla="*/ 340535 w 566739"/>
+                    <a:gd name="connsiteY5" fmla="*/ 0 h 813098"/>
+                    <a:gd name="connsiteX6" fmla="*/ 204398 w 566739"/>
+                    <a:gd name="connsiteY6" fmla="*/ 0 h 813098"/>
+                    <a:gd name="connsiteX7" fmla="*/ 178804 w 566739"/>
+                    <a:gd name="connsiteY7" fmla="*/ 25594 h 813098"/>
+                    <a:gd name="connsiteX8" fmla="*/ 178804 w 566739"/>
+                    <a:gd name="connsiteY8" fmla="*/ 102528 h 813098"/>
+                    <a:gd name="connsiteX9" fmla="*/ 94458 w 566739"/>
+                    <a:gd name="connsiteY9" fmla="*/ 102528 h 813098"/>
+                    <a:gd name="connsiteX10" fmla="*/ 0 w 566739"/>
+                    <a:gd name="connsiteY10" fmla="*/ 196986 h 813098"/>
+                    <a:gd name="connsiteX11" fmla="*/ 0 w 566739"/>
+                    <a:gd name="connsiteY11" fmla="*/ 813098 h 813098"/>
+                  </a:gdLst>
+                  <a:ahLst/>
+                  <a:cxnLst>
+                    <a:cxn ang="0">
+                      <a:pos x="connsiteX0" y="connsiteY0"/>
+                    </a:cxn>
+                    <a:cxn ang="0">
+                      <a:pos x="connsiteX1" y="connsiteY1"/>
+                    </a:cxn>
+                    <a:cxn ang="0">
+                      <a:pos x="connsiteX2" y="connsiteY2"/>
+                    </a:cxn>
+                    <a:cxn ang="0">
+                      <a:pos x="connsiteX3" y="connsiteY3"/>
+                    </a:cxn>
+                    <a:cxn ang="0">
+                      <a:pos x="connsiteX4" y="connsiteY4"/>
+                    </a:cxn>
+                    <a:cxn ang="0">
+                      <a:pos x="connsiteX5" y="connsiteY5"/>
+                    </a:cxn>
+                    <a:cxn ang="0">
+                      <a:pos x="connsiteX6" y="connsiteY6"/>
+                    </a:cxn>
+                    <a:cxn ang="0">
+                      <a:pos x="connsiteX7" y="connsiteY7"/>
+                    </a:cxn>
+                    <a:cxn ang="0">
+                      <a:pos x="connsiteX8" y="connsiteY8"/>
+                    </a:cxn>
+                    <a:cxn ang="0">
+                      <a:pos x="connsiteX9" y="connsiteY9"/>
+                    </a:cxn>
+                    <a:cxn ang="0">
+                      <a:pos x="connsiteX10" y="connsiteY10"/>
+                    </a:cxn>
+                    <a:cxn ang="0">
+                      <a:pos x="connsiteX11" y="connsiteY11"/>
+                    </a:cxn>
+                  </a:cxnLst>
+                  <a:rect l="l" t="t" r="r" b="b"/>
+                  <a:pathLst>
+                    <a:path w="566739" h="813098">
+                      <a:moveTo>
+                        <a:pt x="566739" y="813098"/>
+                      </a:moveTo>
+                      <a:lnTo>
+                        <a:pt x="566739" y="196986"/>
+                      </a:lnTo>
+                      <a:lnTo>
+                        <a:pt x="472281" y="102528"/>
+                      </a:lnTo>
+                      <a:lnTo>
+                        <a:pt x="366129" y="102528"/>
+                      </a:lnTo>
+                      <a:lnTo>
+                        <a:pt x="366129" y="25594"/>
+                      </a:lnTo>
+                      <a:lnTo>
+                        <a:pt x="340535" y="0"/>
+                      </a:lnTo>
+                      <a:lnTo>
+                        <a:pt x="204398" y="0"/>
+                      </a:lnTo>
+                      <a:lnTo>
+                        <a:pt x="178804" y="25594"/>
+                      </a:lnTo>
+                      <a:lnTo>
+                        <a:pt x="178804" y="102528"/>
+                      </a:lnTo>
+                      <a:lnTo>
+                        <a:pt x="94458" y="102528"/>
+                      </a:lnTo>
+                      <a:lnTo>
+                        <a:pt x="0" y="196986"/>
+                      </a:lnTo>
+                      <a:lnTo>
+                        <a:pt x="0" y="813098"/>
+                      </a:lnTo>
+                      <a:close/>
+                    </a:path>
+                  </a:pathLst>
+                </a:custGeom>
+                <a:solidFill>
+                  <a:srgbClr val="FFC000"/>
+                </a:solidFill>
+              </p:spPr>
+              <p:style>
+                <a:lnRef idx="2">
+                  <a:schemeClr val="accent4">
+                    <a:shade val="50000"/>
+                  </a:schemeClr>
+                </a:lnRef>
+                <a:fillRef idx="1">
+                  <a:schemeClr val="accent4"/>
+                </a:fillRef>
+                <a:effectRef idx="0">
+                  <a:schemeClr val="accent4"/>
+                </a:effectRef>
+                <a:fontRef idx="minor">
+                  <a:schemeClr val="lt1"/>
+                </a:fontRef>
+              </p:style>
+              <p:txBody>
+                <a:bodyPr rtlCol="0" anchor="ctr"/>
+                <a:lstStyle/>
+                <a:p>
+                  <a:pPr algn="ctr"/>
+                  <a:endParaRPr lang="zh-TW" altLang="en-US"/>
+                </a:p>
+              </p:txBody>
+            </p:sp>
+            <p:grpSp>
+              <p:nvGrpSpPr>
+                <p:cNvPr id="108" name="群組 107"/>
+                <p:cNvGrpSpPr/>
+                <p:nvPr/>
+              </p:nvGrpSpPr>
+              <p:grpSpPr>
+                <a:xfrm>
+                  <a:off x="2943306" y="1703488"/>
+                  <a:ext cx="237577" cy="476723"/>
+                  <a:chOff x="2943306" y="1688369"/>
+                  <a:chExt cx="237577" cy="476723"/>
+                </a:xfrm>
+              </p:grpSpPr>
+              <p:grpSp>
+                <p:nvGrpSpPr>
+                  <p:cNvPr id="94" name="群組 93"/>
+                  <p:cNvGrpSpPr/>
+                  <p:nvPr/>
+                </p:nvGrpSpPr>
+                <p:grpSpPr>
+                  <a:xfrm>
+                    <a:off x="2943306" y="1688369"/>
+                    <a:ext cx="237577" cy="208298"/>
+                    <a:chOff x="2627312" y="1688368"/>
+                    <a:chExt cx="237577" cy="208298"/>
+                  </a:xfrm>
+                </p:grpSpPr>
+                <p:sp>
+                  <p:nvSpPr>
+                    <p:cNvPr id="84" name="矩形 83"/>
+                    <p:cNvSpPr/>
+                    <p:nvPr/>
+                  </p:nvSpPr>
+                  <p:spPr>
+                    <a:xfrm>
+                      <a:off x="2627312" y="1688368"/>
+                      <a:ext cx="237577" cy="208298"/>
+                    </a:xfrm>
+                    <a:prstGeom prst="rect">
+                      <a:avLst/>
+                    </a:prstGeom>
+                    <a:solidFill>
+                      <a:schemeClr val="accent2">
+                        <a:lumMod val="50000"/>
+                      </a:schemeClr>
+                    </a:solidFill>
+                    <a:ln>
+                      <a:noFill/>
+                    </a:ln>
+                  </p:spPr>
+                  <p:style>
+                    <a:lnRef idx="2">
+                      <a:schemeClr val="accent1">
+                        <a:shade val="50000"/>
+                      </a:schemeClr>
+                    </a:lnRef>
+                    <a:fillRef idx="1">
+                      <a:schemeClr val="accent1"/>
+                    </a:fillRef>
+                    <a:effectRef idx="0">
+                      <a:schemeClr val="accent1"/>
+                    </a:effectRef>
+                    <a:fontRef idx="minor">
+                      <a:schemeClr val="lt1"/>
+                    </a:fontRef>
+                  </p:style>
+                  <p:txBody>
+                    <a:bodyPr rtlCol="0" anchor="ctr"/>
+                    <a:lstStyle/>
+                    <a:p>
+                      <a:pPr algn="ctr"/>
+                      <a:endParaRPr lang="zh-TW" altLang="en-US"/>
+                    </a:p>
+                  </p:txBody>
+                </p:sp>
+                <p:grpSp>
+                  <p:nvGrpSpPr>
+                    <p:cNvPr id="93" name="群組 92"/>
+                    <p:cNvGrpSpPr/>
+                    <p:nvPr/>
+                  </p:nvGrpSpPr>
+                  <p:grpSpPr>
+                    <a:xfrm>
+                      <a:off x="2657364" y="1729100"/>
+                      <a:ext cx="177472" cy="126207"/>
+                      <a:chOff x="2646604" y="1729100"/>
+                      <a:chExt cx="177472" cy="126207"/>
+                    </a:xfrm>
+                  </p:grpSpPr>
+                  <p:sp>
+                    <p:nvSpPr>
+                      <p:cNvPr id="85" name="矩形 84"/>
+                      <p:cNvSpPr/>
+                      <p:nvPr/>
+                    </p:nvSpPr>
+                    <p:spPr>
+                      <a:xfrm>
+                        <a:off x="2646604" y="1729100"/>
+                        <a:ext cx="45719" cy="126207"/>
+                      </a:xfrm>
+                      <a:prstGeom prst="rect">
+                        <a:avLst/>
+                      </a:prstGeom>
+                      <a:solidFill>
+                        <a:srgbClr val="582808"/>
+                      </a:solidFill>
+                      <a:ln>
+                        <a:noFill/>
+                      </a:ln>
+                    </p:spPr>
+                    <p:style>
+                      <a:lnRef idx="2">
+                        <a:schemeClr val="accent1">
+                          <a:shade val="50000"/>
+                        </a:schemeClr>
+                      </a:lnRef>
+                      <a:fillRef idx="1">
+                        <a:schemeClr val="accent1"/>
+                      </a:fillRef>
+                      <a:effectRef idx="0">
+                        <a:schemeClr val="accent1"/>
+                      </a:effectRef>
+                      <a:fontRef idx="minor">
+                        <a:schemeClr val="lt1"/>
+                      </a:fontRef>
+                    </p:style>
+                    <p:txBody>
+                      <a:bodyPr rtlCol="0" anchor="ctr"/>
+                      <a:lstStyle/>
+                      <a:p>
+                        <a:pPr algn="ctr"/>
+                        <a:endParaRPr lang="zh-TW" altLang="en-US"/>
+                      </a:p>
+                    </p:txBody>
+                  </p:sp>
+                  <p:sp>
+                    <p:nvSpPr>
+                      <p:cNvPr id="91" name="矩形 90"/>
+                      <p:cNvSpPr/>
+                      <p:nvPr/>
+                    </p:nvSpPr>
+                    <p:spPr>
+                      <a:xfrm>
+                        <a:off x="2712481" y="1729100"/>
+                        <a:ext cx="45719" cy="126207"/>
+                      </a:xfrm>
+                      <a:prstGeom prst="rect">
+                        <a:avLst/>
+                      </a:prstGeom>
+                      <a:solidFill>
+                        <a:srgbClr val="582808"/>
+                      </a:solidFill>
+                      <a:ln>
+                        <a:noFill/>
+                      </a:ln>
+                    </p:spPr>
+                    <p:style>
+                      <a:lnRef idx="2">
+                        <a:schemeClr val="accent1">
+                          <a:shade val="50000"/>
+                        </a:schemeClr>
+                      </a:lnRef>
+                      <a:fillRef idx="1">
+                        <a:schemeClr val="accent1"/>
+                      </a:fillRef>
+                      <a:effectRef idx="0">
+                        <a:schemeClr val="accent1"/>
+                      </a:effectRef>
+                      <a:fontRef idx="minor">
+                        <a:schemeClr val="lt1"/>
+                      </a:fontRef>
+                    </p:style>
+                    <p:txBody>
+                      <a:bodyPr rtlCol="0" anchor="ctr"/>
+                      <a:lstStyle/>
+                      <a:p>
+                        <a:pPr algn="ctr"/>
+                        <a:endParaRPr lang="zh-TW" altLang="en-US"/>
+                      </a:p>
+                    </p:txBody>
+                  </p:sp>
+                  <p:sp>
+                    <p:nvSpPr>
+                      <p:cNvPr id="92" name="矩形 91"/>
+                      <p:cNvSpPr/>
+                      <p:nvPr/>
+                    </p:nvSpPr>
+                    <p:spPr>
+                      <a:xfrm>
+                        <a:off x="2778357" y="1729100"/>
+                        <a:ext cx="45719" cy="126207"/>
+                      </a:xfrm>
+                      <a:prstGeom prst="rect">
+                        <a:avLst/>
+                      </a:prstGeom>
+                      <a:solidFill>
+                        <a:srgbClr val="582808"/>
+                      </a:solidFill>
+                      <a:ln>
+                        <a:noFill/>
+                      </a:ln>
+                    </p:spPr>
+                    <p:style>
+                      <a:lnRef idx="2">
+                        <a:schemeClr val="accent1">
+                          <a:shade val="50000"/>
+                        </a:schemeClr>
+                      </a:lnRef>
+                      <a:fillRef idx="1">
+                        <a:schemeClr val="accent1"/>
+                      </a:fillRef>
+                      <a:effectRef idx="0">
+                        <a:schemeClr val="accent1"/>
+                      </a:effectRef>
+                      <a:fontRef idx="minor">
+                        <a:schemeClr val="lt1"/>
+                      </a:fontRef>
+                    </p:style>
+                    <p:txBody>
+                      <a:bodyPr rtlCol="0" anchor="ctr"/>
+                      <a:lstStyle/>
+                      <a:p>
+                        <a:pPr algn="ctr"/>
+                        <a:endParaRPr lang="zh-TW" altLang="en-US"/>
+                      </a:p>
+                    </p:txBody>
+                  </p:sp>
+                </p:grpSp>
+              </p:grpSp>
+              <p:grpSp>
+                <p:nvGrpSpPr>
+                  <p:cNvPr id="95" name="群組 94"/>
+                  <p:cNvGrpSpPr/>
+                  <p:nvPr/>
+                </p:nvGrpSpPr>
+                <p:grpSpPr>
+                  <a:xfrm>
+                    <a:off x="2943306" y="1956794"/>
+                    <a:ext cx="237577" cy="208298"/>
+                    <a:chOff x="2627312" y="1688368"/>
+                    <a:chExt cx="237577" cy="208298"/>
+                  </a:xfrm>
+                </p:grpSpPr>
+                <p:sp>
+                  <p:nvSpPr>
+                    <p:cNvPr id="96" name="矩形 95"/>
+                    <p:cNvSpPr/>
+                    <p:nvPr/>
+                  </p:nvSpPr>
+                  <p:spPr>
+                    <a:xfrm>
+                      <a:off x="2627312" y="1688368"/>
+                      <a:ext cx="237577" cy="208298"/>
+                    </a:xfrm>
+                    <a:prstGeom prst="rect">
+                      <a:avLst/>
+                    </a:prstGeom>
+                    <a:solidFill>
+                      <a:schemeClr val="accent2">
+                        <a:lumMod val="50000"/>
+                      </a:schemeClr>
+                    </a:solidFill>
+                    <a:ln>
+                      <a:noFill/>
+                    </a:ln>
+                  </p:spPr>
+                  <p:style>
+                    <a:lnRef idx="2">
+                      <a:schemeClr val="accent1">
+                        <a:shade val="50000"/>
+                      </a:schemeClr>
+                    </a:lnRef>
+                    <a:fillRef idx="1">
+                      <a:schemeClr val="accent1"/>
+                    </a:fillRef>
+                    <a:effectRef idx="0">
+                      <a:schemeClr val="accent1"/>
+                    </a:effectRef>
+                    <a:fontRef idx="minor">
+                      <a:schemeClr val="lt1"/>
+                    </a:fontRef>
+                  </p:style>
+                  <p:txBody>
+                    <a:bodyPr rtlCol="0" anchor="ctr"/>
+                    <a:lstStyle/>
+                    <a:p>
+                      <a:pPr algn="ctr"/>
+                      <a:endParaRPr lang="zh-TW" altLang="en-US"/>
+                    </a:p>
+                  </p:txBody>
+                </p:sp>
+                <p:grpSp>
+                  <p:nvGrpSpPr>
+                    <p:cNvPr id="97" name="群組 96"/>
+                    <p:cNvGrpSpPr/>
+                    <p:nvPr/>
+                  </p:nvGrpSpPr>
+                  <p:grpSpPr>
+                    <a:xfrm>
+                      <a:off x="2657364" y="1729100"/>
+                      <a:ext cx="177472" cy="126207"/>
+                      <a:chOff x="2646604" y="1729100"/>
+                      <a:chExt cx="177472" cy="126207"/>
+                    </a:xfrm>
+                  </p:grpSpPr>
+                  <p:sp>
+                    <p:nvSpPr>
+                      <p:cNvPr id="98" name="矩形 97"/>
+                      <p:cNvSpPr/>
+                      <p:nvPr/>
+                    </p:nvSpPr>
+                    <p:spPr>
+                      <a:xfrm>
+                        <a:off x="2646604" y="1729100"/>
+                        <a:ext cx="45719" cy="126207"/>
+                      </a:xfrm>
+                      <a:prstGeom prst="rect">
+                        <a:avLst/>
+                      </a:prstGeom>
+                      <a:solidFill>
+                        <a:srgbClr val="582808"/>
+                      </a:solidFill>
+                      <a:ln>
+                        <a:noFill/>
+                      </a:ln>
+                    </p:spPr>
+                    <p:style>
+                      <a:lnRef idx="2">
+                        <a:schemeClr val="accent1">
+                          <a:shade val="50000"/>
+                        </a:schemeClr>
+                      </a:lnRef>
+                      <a:fillRef idx="1">
+                        <a:schemeClr val="accent1"/>
+                      </a:fillRef>
+                      <a:effectRef idx="0">
+                        <a:schemeClr val="accent1"/>
+                      </a:effectRef>
+                      <a:fontRef idx="minor">
+                        <a:schemeClr val="lt1"/>
+                      </a:fontRef>
+                    </p:style>
+                    <p:txBody>
+                      <a:bodyPr rtlCol="0" anchor="ctr"/>
+                      <a:lstStyle/>
+                      <a:p>
+                        <a:pPr algn="ctr"/>
+                        <a:endParaRPr lang="zh-TW" altLang="en-US"/>
+                      </a:p>
+                    </p:txBody>
+                  </p:sp>
+                  <p:sp>
+                    <p:nvSpPr>
+                      <p:cNvPr id="99" name="矩形 98"/>
+                      <p:cNvSpPr/>
+                      <p:nvPr/>
+                    </p:nvSpPr>
+                    <p:spPr>
+                      <a:xfrm>
+                        <a:off x="2712481" y="1729100"/>
+                        <a:ext cx="45719" cy="126207"/>
+                      </a:xfrm>
+                      <a:prstGeom prst="rect">
+                        <a:avLst/>
+                      </a:prstGeom>
+                      <a:solidFill>
+                        <a:srgbClr val="582808"/>
+                      </a:solidFill>
+                      <a:ln>
+                        <a:noFill/>
+                      </a:ln>
+                    </p:spPr>
+                    <p:style>
+                      <a:lnRef idx="2">
+                        <a:schemeClr val="accent1">
+                          <a:shade val="50000"/>
+                        </a:schemeClr>
+                      </a:lnRef>
+                      <a:fillRef idx="1">
+                        <a:schemeClr val="accent1"/>
+                      </a:fillRef>
+                      <a:effectRef idx="0">
+                        <a:schemeClr val="accent1"/>
+                      </a:effectRef>
+                      <a:fontRef idx="minor">
+                        <a:schemeClr val="lt1"/>
+                      </a:fontRef>
+                    </p:style>
+                    <p:txBody>
+                      <a:bodyPr rtlCol="0" anchor="ctr"/>
+                      <a:lstStyle/>
+                      <a:p>
+                        <a:pPr algn="ctr"/>
+                        <a:endParaRPr lang="zh-TW" altLang="en-US"/>
+                      </a:p>
+                    </p:txBody>
+                  </p:sp>
+                  <p:sp>
+                    <p:nvSpPr>
+                      <p:cNvPr id="100" name="矩形 99"/>
+                      <p:cNvSpPr/>
+                      <p:nvPr/>
+                    </p:nvSpPr>
+                    <p:spPr>
+                      <a:xfrm>
+                        <a:off x="2778357" y="1729100"/>
+                        <a:ext cx="45719" cy="126207"/>
+                      </a:xfrm>
+                      <a:prstGeom prst="rect">
+                        <a:avLst/>
+                      </a:prstGeom>
+                      <a:solidFill>
+                        <a:srgbClr val="582808"/>
+                      </a:solidFill>
+                      <a:ln>
+                        <a:noFill/>
+                      </a:ln>
+                    </p:spPr>
+                    <p:style>
+                      <a:lnRef idx="2">
+                        <a:schemeClr val="accent1">
+                          <a:shade val="50000"/>
+                        </a:schemeClr>
+                      </a:lnRef>
+                      <a:fillRef idx="1">
+                        <a:schemeClr val="accent1"/>
+                      </a:fillRef>
+                      <a:effectRef idx="0">
+                        <a:schemeClr val="accent1"/>
+                      </a:effectRef>
+                      <a:fontRef idx="minor">
+                        <a:schemeClr val="lt1"/>
+                      </a:fontRef>
+                    </p:style>
+                    <p:txBody>
+                      <a:bodyPr rtlCol="0" anchor="ctr"/>
+                      <a:lstStyle/>
+                      <a:p>
+                        <a:pPr algn="ctr"/>
+                        <a:endParaRPr lang="zh-TW" altLang="en-US"/>
+                      </a:p>
+                    </p:txBody>
+                  </p:sp>
+                </p:grpSp>
+              </p:grpSp>
+            </p:grpSp>
+            <p:pic>
+              <p:nvPicPr>
+                <p:cNvPr id="102" name="圖片 101" descr="Llave inglesa Stock de Foto gratis - Public Domain Pictures"/>
+                <p:cNvPicPr>
+                  <a:picLocks noChangeAspect="1"/>
+                </p:cNvPicPr>
+                <p:nvPr/>
+              </p:nvPicPr>
+              <p:blipFill rotWithShape="1">
+                <a:blip r:embed="rId2" cstate="print">
+                  <a:duotone>
+                    <a:schemeClr val="accent2">
+                      <a:shade val="45000"/>
+                      <a:satMod val="135000"/>
+                    </a:schemeClr>
+                    <a:prstClr val="white"/>
+                  </a:duotone>
+                  <a:extLst>
+                    <a:ext uri="{BEBA8EAE-BF5A-486C-A8C5-ECC9F3942E4B}">
+                      <a14:imgProps xmlns:a14="http://schemas.microsoft.com/office/drawing/2010/main">
+                        <a14:imgLayer r:embed="rId3">
+                          <a14:imgEffect>
+                            <a14:backgroundRemoval t="8000" b="90667" l="0" r="88024">
+                              <a14:foregroundMark x1="27545" y1="30000" x2="27545" y2="30000"/>
+                              <a14:foregroundMark x1="57485" y1="67333" x2="57485" y2="67333"/>
+                            </a14:backgroundRemoval>
+                          </a14:imgEffect>
+                        </a14:imgLayer>
+                      </a14:imgProps>
+                    </a:ext>
+                    <a:ext uri="{28A0092B-C50C-407E-A947-70E740481C1C}">
+                      <a14:useLocalDpi xmlns:a14="http://schemas.microsoft.com/office/drawing/2010/main" val="0"/>
+                    </a:ext>
+                  </a:extLst>
+                </a:blip>
+                <a:srcRect l="3219" t="7790" r="12575" b="9918"/>
+                <a:stretch/>
+              </p:blipFill>
+              <p:spPr>
+                <a:xfrm rot="5400000">
+                  <a:off x="3206565" y="1772843"/>
+                  <a:ext cx="385078" cy="338012"/>
+                </a:xfrm>
+                <a:prstGeom prst="rect">
+                  <a:avLst/>
+                </a:prstGeom>
+              </p:spPr>
+            </p:pic>
+          </p:grpSp>
+          <p:grpSp>
+            <p:nvGrpSpPr>
+              <p:cNvPr id="105" name="群組 104"/>
+              <p:cNvGrpSpPr/>
+              <p:nvPr/>
+            </p:nvGrpSpPr>
+            <p:grpSpPr>
+              <a:xfrm>
+                <a:off x="3362257" y="1570986"/>
+                <a:ext cx="690990" cy="787457"/>
+                <a:chOff x="3970590" y="1562490"/>
+                <a:chExt cx="690990" cy="787457"/>
+              </a:xfrm>
+            </p:grpSpPr>
+            <p:sp>
+              <p:nvSpPr>
+                <p:cNvPr id="103" name="剪去同側角落矩形 102"/>
+                <p:cNvSpPr/>
+                <p:nvPr/>
+              </p:nvSpPr>
+              <p:spPr>
+                <a:xfrm rot="16200000">
+                  <a:off x="3912312" y="1620768"/>
+                  <a:ext cx="787457" cy="670901"/>
+                </a:xfrm>
+                <a:prstGeom prst="snip2SameRect">
+                  <a:avLst/>
+                </a:prstGeom>
+                <a:solidFill>
+                  <a:schemeClr val="accent4">
+                    <a:lumMod val="75000"/>
+                  </a:schemeClr>
+                </a:solidFill>
+                <a:ln>
+                  <a:solidFill>
+                    <a:schemeClr val="accent4">
+                      <a:lumMod val="50000"/>
+                    </a:schemeClr>
+                  </a:solidFill>
+                </a:ln>
+                <a:scene3d>
+                  <a:camera prst="orthographicFront">
+                    <a:rot lat="5100000" lon="0" rev="0"/>
+                  </a:camera>
+                  <a:lightRig rig="threePt" dir="t"/>
+                </a:scene3d>
+              </p:spPr>
+              <p:style>
+                <a:lnRef idx="2">
+                  <a:schemeClr val="accent1">
+                    <a:shade val="50000"/>
+                  </a:schemeClr>
+                </a:lnRef>
+                <a:fillRef idx="1">
+                  <a:schemeClr val="accent1"/>
+                </a:fillRef>
+                <a:effectRef idx="0">
+                  <a:schemeClr val="accent1"/>
+                </a:effectRef>
+                <a:fontRef idx="minor">
+                  <a:schemeClr val="lt1"/>
+                </a:fontRef>
+              </p:style>
+              <p:txBody>
+                <a:bodyPr rtlCol="0" anchor="ctr"/>
+                <a:lstStyle/>
+                <a:p>
+                  <a:pPr algn="ctr"/>
+                  <a:endParaRPr lang="zh-TW" altLang="en-US"/>
+                </a:p>
+              </p:txBody>
+            </p:sp>
+            <p:sp>
+              <p:nvSpPr>
+                <p:cNvPr id="104" name="剪去同側角落矩形 103"/>
+                <p:cNvSpPr/>
+                <p:nvPr/>
+              </p:nvSpPr>
+              <p:spPr>
+                <a:xfrm rot="16200000">
+                  <a:off x="3932402" y="1620768"/>
+                  <a:ext cx="787455" cy="670901"/>
+                </a:xfrm>
+                <a:prstGeom prst="snip2SameRect">
+                  <a:avLst/>
+                </a:prstGeom>
+                <a:solidFill>
+                  <a:srgbClr val="D9A913"/>
+                </a:solidFill>
+                <a:ln>
+                  <a:solidFill>
+                    <a:schemeClr val="accent4">
+                      <a:lumMod val="50000"/>
+                    </a:schemeClr>
+                  </a:solidFill>
+                </a:ln>
+                <a:scene3d>
+                  <a:camera prst="orthographicFront">
+                    <a:rot lat="5100000" lon="0" rev="0"/>
+                  </a:camera>
+                  <a:lightRig rig="threePt" dir="t"/>
+                </a:scene3d>
+              </p:spPr>
+              <p:style>
+                <a:lnRef idx="2">
+                  <a:schemeClr val="accent1">
+                    <a:shade val="50000"/>
+                  </a:schemeClr>
+                </a:lnRef>
+                <a:fillRef idx="1">
+                  <a:schemeClr val="accent1"/>
+                </a:fillRef>
+                <a:effectRef idx="0">
+                  <a:schemeClr val="accent1"/>
+                </a:effectRef>
+                <a:fontRef idx="minor">
+                  <a:schemeClr val="lt1"/>
+                </a:fontRef>
+              </p:style>
+              <p:txBody>
+                <a:bodyPr rtlCol="0" anchor="ctr"/>
+                <a:lstStyle/>
+                <a:p>
+                  <a:pPr algn="ctr"/>
+                  <a:endParaRPr lang="zh-TW" altLang="en-US"/>
+                </a:p>
+              </p:txBody>
+            </p:sp>
+          </p:grpSp>
+        </p:grpSp>
+      </p:grpSp>
+      <p:grpSp>
+        <p:nvGrpSpPr>
+          <p:cNvPr id="128" name="群組 127"/>
+          <p:cNvGrpSpPr/>
+          <p:nvPr/>
+        </p:nvGrpSpPr>
+        <p:grpSpPr>
+          <a:xfrm>
+            <a:off x="3718290" y="374581"/>
+            <a:ext cx="1011962" cy="1030061"/>
+            <a:chOff x="3411793" y="1450521"/>
+            <a:chExt cx="1011962" cy="1030061"/>
+          </a:xfrm>
+        </p:grpSpPr>
+        <p:sp>
+          <p:nvSpPr>
+            <p:cNvPr id="116" name="手繪多邊形 115"/>
+            <p:cNvSpPr/>
+            <p:nvPr/>
+          </p:nvSpPr>
+          <p:spPr>
+            <a:xfrm flipV="1">
+              <a:off x="3411793" y="1450521"/>
+              <a:ext cx="1011962" cy="1030061"/>
+            </a:xfrm>
+            <a:custGeom>
+              <a:avLst/>
+              <a:gdLst>
+                <a:gd name="connsiteX0" fmla="*/ 123336 w 1011962"/>
+                <a:gd name="connsiteY0" fmla="*/ 1030061 h 1030061"/>
+                <a:gd name="connsiteX1" fmla="*/ 888626 w 1011962"/>
+                <a:gd name="connsiteY1" fmla="*/ 1030061 h 1030061"/>
+                <a:gd name="connsiteX2" fmla="*/ 1011962 w 1011962"/>
+                <a:gd name="connsiteY2" fmla="*/ 906725 h 1030061"/>
+                <a:gd name="connsiteX3" fmla="*/ 1011962 w 1011962"/>
+                <a:gd name="connsiteY3" fmla="*/ 740002 h 1030061"/>
+                <a:gd name="connsiteX4" fmla="*/ 1011962 w 1011962"/>
+                <a:gd name="connsiteY4" fmla="*/ 290059 h 1030061"/>
+                <a:gd name="connsiteX5" fmla="*/ 1011962 w 1011962"/>
+                <a:gd name="connsiteY5" fmla="*/ 123336 h 1030061"/>
+                <a:gd name="connsiteX6" fmla="*/ 888626 w 1011962"/>
+                <a:gd name="connsiteY6" fmla="*/ 0 h 1030061"/>
+                <a:gd name="connsiteX7" fmla="*/ 123336 w 1011962"/>
+                <a:gd name="connsiteY7" fmla="*/ 0 h 1030061"/>
+                <a:gd name="connsiteX8" fmla="*/ 0 w 1011962"/>
+                <a:gd name="connsiteY8" fmla="*/ 123336 h 1030061"/>
+                <a:gd name="connsiteX9" fmla="*/ 0 w 1011962"/>
+                <a:gd name="connsiteY9" fmla="*/ 290059 h 1030061"/>
+                <a:gd name="connsiteX10" fmla="*/ 0 w 1011962"/>
+                <a:gd name="connsiteY10" fmla="*/ 740002 h 1030061"/>
+                <a:gd name="connsiteX11" fmla="*/ 0 w 1011962"/>
+                <a:gd name="connsiteY11" fmla="*/ 906725 h 1030061"/>
+              </a:gdLst>
+              <a:ahLst/>
+              <a:cxnLst>
+                <a:cxn ang="0">
+                  <a:pos x="connsiteX0" y="connsiteY0"/>
+                </a:cxn>
+                <a:cxn ang="0">
+                  <a:pos x="connsiteX1" y="connsiteY1"/>
+                </a:cxn>
+                <a:cxn ang="0">
+                  <a:pos x="connsiteX2" y="connsiteY2"/>
+                </a:cxn>
+                <a:cxn ang="0">
+                  <a:pos x="connsiteX3" y="connsiteY3"/>
+                </a:cxn>
+                <a:cxn ang="0">
+                  <a:pos x="connsiteX4" y="connsiteY4"/>
+                </a:cxn>
+                <a:cxn ang="0">
+                  <a:pos x="connsiteX5" y="connsiteY5"/>
+                </a:cxn>
+                <a:cxn ang="0">
+                  <a:pos x="connsiteX6" y="connsiteY6"/>
+                </a:cxn>
+                <a:cxn ang="0">
+                  <a:pos x="connsiteX7" y="connsiteY7"/>
+                </a:cxn>
+                <a:cxn ang="0">
+                  <a:pos x="connsiteX8" y="connsiteY8"/>
+                </a:cxn>
+                <a:cxn ang="0">
+                  <a:pos x="connsiteX9" y="connsiteY9"/>
+                </a:cxn>
+                <a:cxn ang="0">
+                  <a:pos x="connsiteX10" y="connsiteY10"/>
+                </a:cxn>
+                <a:cxn ang="0">
+                  <a:pos x="connsiteX11" y="connsiteY11"/>
+                </a:cxn>
+              </a:cxnLst>
+              <a:rect l="l" t="t" r="r" b="b"/>
+              <a:pathLst>
+                <a:path w="1011962" h="1030061">
+                  <a:moveTo>
+                    <a:pt x="123336" y="1030061"/>
+                  </a:moveTo>
+                  <a:lnTo>
+                    <a:pt x="888626" y="1030061"/>
+                  </a:lnTo>
+                  <a:lnTo>
+                    <a:pt x="1011962" y="906725"/>
+                  </a:lnTo>
+                  <a:lnTo>
+                    <a:pt x="1011962" y="740002"/>
+                  </a:lnTo>
+                  <a:lnTo>
+                    <a:pt x="1011962" y="290059"/>
+                  </a:lnTo>
+                  <a:lnTo>
+                    <a:pt x="1011962" y="123336"/>
+                  </a:lnTo>
+                  <a:lnTo>
+                    <a:pt x="888626" y="0"/>
+                  </a:lnTo>
+                  <a:lnTo>
+                    <a:pt x="123336" y="0"/>
+                  </a:lnTo>
+                  <a:lnTo>
+                    <a:pt x="0" y="123336"/>
+                  </a:lnTo>
+                  <a:lnTo>
+                    <a:pt x="0" y="290059"/>
+                  </a:lnTo>
+                  <a:lnTo>
+                    <a:pt x="0" y="740002"/>
+                  </a:lnTo>
+                  <a:lnTo>
+                    <a:pt x="0" y="906725"/>
+                  </a:lnTo>
+                  <a:close/>
+                </a:path>
+              </a:pathLst>
+            </a:custGeom>
+            <a:solidFill>
+              <a:srgbClr val="6DAD65"/>
+            </a:solidFill>
+            <a:ln>
+              <a:solidFill>
+                <a:schemeClr val="accent6">
+                  <a:lumMod val="75000"/>
+                </a:schemeClr>
+              </a:solidFill>
+            </a:ln>
+          </p:spPr>
+          <p:style>
+            <a:lnRef idx="2">
+              <a:schemeClr val="accent1">
+                <a:shade val="50000"/>
+              </a:schemeClr>
+            </a:lnRef>
+            <a:fillRef idx="1">
+              <a:schemeClr val="accent1"/>
+            </a:fillRef>
+            <a:effectRef idx="0">
+              <a:schemeClr val="accent1"/>
+            </a:effectRef>
+            <a:fontRef idx="minor">
+              <a:schemeClr val="lt1"/>
+            </a:fontRef>
+          </p:style>
+          <p:txBody>
+            <a:bodyPr rtlCol="0" anchor="ctr"/>
+            <a:lstStyle/>
+            <a:p>
+              <a:pPr algn="ctr"/>
+              <a:endParaRPr lang="zh-TW" altLang="en-US"/>
+            </a:p>
+          </p:txBody>
+        </p:sp>
+        <p:grpSp>
+          <p:nvGrpSpPr>
+            <p:cNvPr id="127" name="群組 126"/>
+            <p:cNvGrpSpPr/>
+            <p:nvPr/>
+          </p:nvGrpSpPr>
+          <p:grpSpPr>
+            <a:xfrm>
+              <a:off x="3606623" y="1594699"/>
+              <a:ext cx="622302" cy="741703"/>
+              <a:chOff x="4933771" y="1739033"/>
+              <a:chExt cx="622302" cy="954882"/>
+            </a:xfrm>
+          </p:grpSpPr>
+          <p:sp>
+            <p:nvSpPr>
+              <p:cNvPr id="126" name="矩形 125"/>
+              <p:cNvSpPr/>
+              <p:nvPr/>
+            </p:nvSpPr>
+            <p:spPr>
+              <a:xfrm>
+                <a:off x="5073472" y="1739033"/>
+                <a:ext cx="342900" cy="149679"/>
+              </a:xfrm>
+              <a:prstGeom prst="rect">
+                <a:avLst/>
+              </a:prstGeom>
+              <a:solidFill>
+                <a:schemeClr val="accent6">
+                  <a:lumMod val="50000"/>
+                </a:schemeClr>
+              </a:solidFill>
+              <a:ln>
+                <a:noFill/>
+              </a:ln>
+            </p:spPr>
+            <p:style>
+              <a:lnRef idx="2">
+                <a:schemeClr val="accent1">
+                  <a:shade val="50000"/>
+                </a:schemeClr>
+              </a:lnRef>
+              <a:fillRef idx="1">
+                <a:schemeClr val="accent1"/>
+              </a:fillRef>
+              <a:effectRef idx="0">
+                <a:schemeClr val="accent1"/>
+              </a:effectRef>
+              <a:fontRef idx="minor">
+                <a:schemeClr val="lt1"/>
+              </a:fontRef>
+            </p:style>
+            <p:txBody>
+              <a:bodyPr rtlCol="0" anchor="ctr"/>
+              <a:lstStyle/>
+              <a:p>
+                <a:pPr algn="ctr"/>
+                <a:endParaRPr lang="zh-TW" altLang="en-US"/>
+              </a:p>
+            </p:txBody>
+          </p:sp>
+          <p:sp>
+            <p:nvSpPr>
+              <p:cNvPr id="124" name="手繪多邊形 123"/>
+              <p:cNvSpPr/>
+              <p:nvPr/>
+            </p:nvSpPr>
+            <p:spPr>
+              <a:xfrm>
+                <a:off x="4933771" y="1850612"/>
+                <a:ext cx="622302" cy="843303"/>
+              </a:xfrm>
+              <a:custGeom>
+                <a:avLst/>
+                <a:gdLst>
+                  <a:gd name="connsiteX0" fmla="*/ 130176 w 622302"/>
+                  <a:gd name="connsiteY0" fmla="*/ 0 h 843303"/>
+                  <a:gd name="connsiteX1" fmla="*/ 492126 w 622302"/>
+                  <a:gd name="connsiteY1" fmla="*/ 0 h 843303"/>
+                  <a:gd name="connsiteX2" fmla="*/ 492126 w 622302"/>
+                  <a:gd name="connsiteY2" fmla="*/ 115578 h 843303"/>
+                  <a:gd name="connsiteX3" fmla="*/ 554507 w 622302"/>
+                  <a:gd name="connsiteY3" fmla="*/ 156950 h 843303"/>
+                  <a:gd name="connsiteX4" fmla="*/ 617600 w 622302"/>
+                  <a:gd name="connsiteY4" fmla="*/ 272065 h 843303"/>
+                  <a:gd name="connsiteX5" fmla="*/ 619653 w 622302"/>
+                  <a:gd name="connsiteY5" fmla="*/ 292100 h 843303"/>
+                  <a:gd name="connsiteX6" fmla="*/ 622301 w 622302"/>
+                  <a:gd name="connsiteY6" fmla="*/ 292100 h 843303"/>
+                  <a:gd name="connsiteX7" fmla="*/ 622301 w 622302"/>
+                  <a:gd name="connsiteY7" fmla="*/ 317943 h 843303"/>
+                  <a:gd name="connsiteX8" fmla="*/ 622302 w 622302"/>
+                  <a:gd name="connsiteY8" fmla="*/ 317953 h 843303"/>
+                  <a:gd name="connsiteX9" fmla="*/ 622301 w 622302"/>
+                  <a:gd name="connsiteY9" fmla="*/ 317963 h 843303"/>
+                  <a:gd name="connsiteX10" fmla="*/ 622301 w 622302"/>
+                  <a:gd name="connsiteY10" fmla="*/ 654044 h 843303"/>
+                  <a:gd name="connsiteX11" fmla="*/ 622302 w 622302"/>
+                  <a:gd name="connsiteY11" fmla="*/ 654050 h 843303"/>
+                  <a:gd name="connsiteX12" fmla="*/ 311151 w 622302"/>
+                  <a:gd name="connsiteY12" fmla="*/ 843303 h 843303"/>
+                  <a:gd name="connsiteX13" fmla="*/ 0 w 622302"/>
+                  <a:gd name="connsiteY13" fmla="*/ 654050 h 843303"/>
+                  <a:gd name="connsiteX14" fmla="*/ 1 w 622302"/>
+                  <a:gd name="connsiteY14" fmla="*/ 654044 h 843303"/>
+                  <a:gd name="connsiteX15" fmla="*/ 1 w 622302"/>
+                  <a:gd name="connsiteY15" fmla="*/ 317953 h 843303"/>
+                  <a:gd name="connsiteX16" fmla="*/ 1 w 622302"/>
+                  <a:gd name="connsiteY16" fmla="*/ 292100 h 843303"/>
+                  <a:gd name="connsiteX17" fmla="*/ 2650 w 622302"/>
+                  <a:gd name="connsiteY17" fmla="*/ 292100 h 843303"/>
+                  <a:gd name="connsiteX18" fmla="*/ 4703 w 622302"/>
+                  <a:gd name="connsiteY18" fmla="*/ 272065 h 843303"/>
+                  <a:gd name="connsiteX19" fmla="*/ 67796 w 622302"/>
+                  <a:gd name="connsiteY19" fmla="*/ 156950 h 843303"/>
+                  <a:gd name="connsiteX20" fmla="*/ 130176 w 622302"/>
+                  <a:gd name="connsiteY20" fmla="*/ 115579 h 843303"/>
+                </a:gdLst>
+                <a:ahLst/>
+                <a:cxnLst>
+                  <a:cxn ang="0">
+                    <a:pos x="connsiteX0" y="connsiteY0"/>
+                  </a:cxn>
+                  <a:cxn ang="0">
+                    <a:pos x="connsiteX1" y="connsiteY1"/>
+                  </a:cxn>
+                  <a:cxn ang="0">
+                    <a:pos x="connsiteX2" y="connsiteY2"/>
+                  </a:cxn>
+                  <a:cxn ang="0">
+                    <a:pos x="connsiteX3" y="connsiteY3"/>
+                  </a:cxn>
+                  <a:cxn ang="0">
+                    <a:pos x="connsiteX4" y="connsiteY4"/>
+                  </a:cxn>
+                  <a:cxn ang="0">
+                    <a:pos x="connsiteX5" y="connsiteY5"/>
+                  </a:cxn>
+                  <a:cxn ang="0">
+                    <a:pos x="connsiteX6" y="connsiteY6"/>
+                  </a:cxn>
+                  <a:cxn ang="0">
+                    <a:pos x="connsiteX7" y="connsiteY7"/>
+                  </a:cxn>
+                  <a:cxn ang="0">
+                    <a:pos x="connsiteX8" y="connsiteY8"/>
+                  </a:cxn>
+                  <a:cxn ang="0">
+                    <a:pos x="connsiteX9" y="connsiteY9"/>
+                  </a:cxn>
+                  <a:cxn ang="0">
+                    <a:pos x="connsiteX10" y="connsiteY10"/>
+                  </a:cxn>
+                  <a:cxn ang="0">
+                    <a:pos x="connsiteX11" y="connsiteY11"/>
+                  </a:cxn>
+                  <a:cxn ang="0">
+                    <a:pos x="connsiteX12" y="connsiteY12"/>
+                  </a:cxn>
+                  <a:cxn ang="0">
+                    <a:pos x="connsiteX13" y="connsiteY13"/>
+                  </a:cxn>
+                  <a:cxn ang="0">
+                    <a:pos x="connsiteX14" y="connsiteY14"/>
+                  </a:cxn>
+                  <a:cxn ang="0">
+                    <a:pos x="connsiteX15" y="connsiteY15"/>
+                  </a:cxn>
+                  <a:cxn ang="0">
+                    <a:pos x="connsiteX16" y="connsiteY16"/>
+                  </a:cxn>
+                  <a:cxn ang="0">
+                    <a:pos x="connsiteX17" y="connsiteY17"/>
+                  </a:cxn>
+                  <a:cxn ang="0">
+                    <a:pos x="connsiteX18" y="connsiteY18"/>
+                  </a:cxn>
+                  <a:cxn ang="0">
+                    <a:pos x="connsiteX19" y="connsiteY19"/>
+                  </a:cxn>
+                  <a:cxn ang="0">
+                    <a:pos x="connsiteX20" y="connsiteY20"/>
+                  </a:cxn>
+                </a:cxnLst>
+                <a:rect l="l" t="t" r="r" b="b"/>
+                <a:pathLst>
+                  <a:path w="622302" h="843303">
+                    <a:moveTo>
+                      <a:pt x="130176" y="0"/>
+                    </a:moveTo>
+                    <a:lnTo>
+                      <a:pt x="492126" y="0"/>
+                    </a:lnTo>
+                    <a:lnTo>
+                      <a:pt x="492126" y="115578"/>
+                    </a:lnTo>
+                    <a:lnTo>
+                      <a:pt x="554507" y="156950"/>
+                    </a:lnTo>
+                    <a:cubicBezTo>
+                      <a:pt x="585923" y="187854"/>
+                      <a:pt x="608350" y="227599"/>
+                      <a:pt x="617600" y="272065"/>
+                    </a:cubicBezTo>
+                    <a:lnTo>
+                      <a:pt x="619653" y="292100"/>
+                    </a:lnTo>
+                    <a:lnTo>
+                      <a:pt x="622301" y="292100"/>
+                    </a:lnTo>
+                    <a:lnTo>
+                      <a:pt x="622301" y="317943"/>
+                    </a:lnTo>
+                    <a:lnTo>
+                      <a:pt x="622302" y="317953"/>
+                    </a:lnTo>
+                    <a:lnTo>
+                      <a:pt x="622301" y="317963"/>
+                    </a:lnTo>
+                    <a:lnTo>
+                      <a:pt x="622301" y="654044"/>
+                    </a:lnTo>
+                    <a:lnTo>
+                      <a:pt x="622302" y="654050"/>
+                    </a:lnTo>
+                    <a:cubicBezTo>
+                      <a:pt x="622302" y="758572"/>
+                      <a:pt x="482995" y="843303"/>
+                      <a:pt x="311151" y="843303"/>
+                    </a:cubicBezTo>
+                    <a:cubicBezTo>
+                      <a:pt x="139307" y="843303"/>
+                      <a:pt x="0" y="758572"/>
+                      <a:pt x="0" y="654050"/>
+                    </a:cubicBezTo>
+                    <a:lnTo>
+                      <a:pt x="1" y="654044"/>
+                    </a:lnTo>
+                    <a:lnTo>
+                      <a:pt x="1" y="317953"/>
+                    </a:lnTo>
+                    <a:lnTo>
+                      <a:pt x="1" y="292100"/>
+                    </a:lnTo>
+                    <a:lnTo>
+                      <a:pt x="2650" y="292100"/>
+                    </a:lnTo>
+                    <a:lnTo>
+                      <a:pt x="4703" y="272065"/>
+                    </a:lnTo>
+                    <a:cubicBezTo>
+                      <a:pt x="13953" y="227599"/>
+                      <a:pt x="36380" y="187854"/>
+                      <a:pt x="67796" y="156950"/>
+                    </a:cubicBezTo>
+                    <a:lnTo>
+                      <a:pt x="130176" y="115579"/>
+                    </a:lnTo>
+                    <a:close/>
+                  </a:path>
+                </a:pathLst>
+              </a:custGeom>
+              <a:solidFill>
+                <a:schemeClr val="accent6">
+                  <a:lumMod val="75000"/>
+                </a:schemeClr>
+              </a:solidFill>
+              <a:ln>
+                <a:solidFill>
+                  <a:schemeClr val="accent6">
+                    <a:lumMod val="50000"/>
+                  </a:schemeClr>
+                </a:solidFill>
+              </a:ln>
+            </p:spPr>
+            <p:style>
+              <a:lnRef idx="2">
+                <a:schemeClr val="accent1">
+                  <a:shade val="50000"/>
+                </a:schemeClr>
+              </a:lnRef>
+              <a:fillRef idx="1">
+                <a:schemeClr val="accent1"/>
+              </a:fillRef>
+              <a:effectRef idx="0">
+                <a:schemeClr val="accent1"/>
+              </a:effectRef>
+              <a:fontRef idx="minor">
+                <a:schemeClr val="lt1"/>
+              </a:fontRef>
+            </p:style>
+            <p:txBody>
+              <a:bodyPr rtlCol="0" anchor="ctr"/>
+              <a:lstStyle/>
+              <a:p>
+                <a:pPr algn="ctr"/>
+                <a:endParaRPr lang="zh-TW" altLang="en-US"/>
+              </a:p>
+            </p:txBody>
+          </p:sp>
+        </p:grpSp>
+      </p:grpSp>
+    </p:spTree>
+    <p:extLst>
+      <p:ext uri="{BB962C8B-B14F-4D97-AF65-F5344CB8AC3E}">
+        <p14:creationId xmlns:p14="http://schemas.microsoft.com/office/powerpoint/2010/main" val="2651322481"/>
+      </p:ext>
+    </p:extLst>
+  </p:cSld>
+  <p:clrMapOvr>
+    <a:masterClrMapping/>
+  </p:clrMapOvr>
+</p:sld>
+</file>
+
 <file path=ppt/theme/theme1.xml><?xml version="1.0" encoding="utf-8"?>
 <a:theme xmlns:a="http://schemas.openxmlformats.org/drawingml/2006/main" name="Office 佈景主題">
   <a:themeElements>

</xml_diff>